<commit_message>
More updates to MT sections, mostly 4
Updates to presentation & demonstrative code for section 4.
Minor updates to presentation & code for 3 and 6.
</commit_message>
<xml_diff>
--- a/presentations/3 - Programming Basics 1 - Poke the Box.pptx
+++ b/presentations/3 - Programming Basics 1 - Poke the Box.pptx
@@ -237,7 +237,7 @@
           <a:p>
             <a:fld id="{0C3747FC-B9FC-4317-A7AC-005EC1BA3397}" type="datetimeFigureOut">
               <a:rPr lang="en-US" smtClean="0"/>
-              <a:t>11/6/2023</a:t>
+              <a:t>11/9/2023</a:t>
             </a:fld>
             <a:endParaRPr lang="en-US"/>
           </a:p>
@@ -653,7 +653,28 @@
           <a:bodyPr/>
           <a:lstStyle/>
           <a:p>
+            <a:r>
+              <a:rPr lang="en-US" dirty="0"/>
+              <a:t>… so here’s a silly example</a:t>
+            </a:r>
+          </a:p>
+          <a:p>
             <a:endParaRPr lang="en-US" dirty="0"/>
+          </a:p>
+          <a:p>
+            <a:r>
+              <a:rPr lang="en-US" dirty="0"/>
+              <a:t>… we get a vector OUT, and check out how this works: </a:t>
+            </a:r>
+          </a:p>
+          <a:p>
+            <a:endParaRPr lang="en-US" dirty="0"/>
+          </a:p>
+          <a:p>
+            <a:r>
+              <a:rPr lang="en-US" dirty="0"/>
+              <a:t>If it’s useful, you can think of this like dragging a formula down in Excel – and just like Excel, the RELATIVE POSITION gets preserved</a:t>
+            </a:r>
           </a:p>
         </p:txBody>
       </p:sp>
@@ -739,7 +760,7 @@
           <a:p>
             <a:r>
               <a:rPr lang="en-US" dirty="0"/>
-              <a:t>Ok, here’s a brain teaser.</a:t>
+              <a:t>So what happens when you mix vectors and single numbers</a:t>
             </a:r>
           </a:p>
           <a:p>
@@ -748,7 +769,7 @@
           <a:p>
             <a:r>
               <a:rPr lang="en-US" dirty="0"/>
-              <a:t>We have a single number, and two vectors.</a:t>
+              <a:t>… you get a vector out, but it adds one to ALL elements</a:t>
             </a:r>
           </a:p>
           <a:p>
@@ -757,7 +778,7 @@
           <a:p>
             <a:r>
               <a:rPr lang="en-US" dirty="0"/>
-              <a:t>What happens when we add them all together?</a:t>
+              <a:t>So maybe this is how it works in Excel land?</a:t>
             </a:r>
           </a:p>
         </p:txBody>
@@ -779,7 +800,7 @@
           <a:p>
             <a:fld id="{4D7B2489-0EE5-4C7F-94A6-A858195D0567}" type="slidenum">
               <a:rPr lang="en-US" smtClean="0"/>
-              <a:t>12</a:t>
+              <a:t>11</a:t>
             </a:fld>
             <a:endParaRPr lang="en-US"/>
           </a:p>
@@ -788,7 +809,7 @@
     </p:spTree>
     <p:extLst>
       <p:ext uri="{BB962C8B-B14F-4D97-AF65-F5344CB8AC3E}">
-        <p14:creationId xmlns:p14="http://schemas.microsoft.com/office/powerpoint/2010/main" val="1284866668"/>
+        <p14:creationId xmlns:p14="http://schemas.microsoft.com/office/powerpoint/2010/main" val="1637829726"/>
       </p:ext>
     </p:extLst>
   </p:cSld>
@@ -844,7 +865,7 @@
           <a:p>
             <a:r>
               <a:rPr lang="en-US" dirty="0"/>
-              <a:t>Ok, here’s a brain teaser.</a:t>
+              <a:t>So let’s try this.</a:t>
             </a:r>
           </a:p>
           <a:p>
@@ -853,16 +874,7 @@
           <a:p>
             <a:r>
               <a:rPr lang="en-US" dirty="0"/>
-              <a:t>We have a single number, and two vectors.</a:t>
-            </a:r>
-          </a:p>
-          <a:p>
-            <a:endParaRPr lang="en-US" dirty="0"/>
-          </a:p>
-          <a:p>
-            <a:r>
-              <a:rPr lang="en-US" dirty="0"/>
-              <a:t>What happens when we add them all together?</a:t>
+              <a:t>What do you think will happen?</a:t>
             </a:r>
           </a:p>
         </p:txBody>
@@ -884,7 +896,7 @@
           <a:p>
             <a:fld id="{4D7B2489-0EE5-4C7F-94A6-A858195D0567}" type="slidenum">
               <a:rPr lang="en-US" smtClean="0"/>
-              <a:t>13</a:t>
+              <a:t>12</a:t>
             </a:fld>
             <a:endParaRPr lang="en-US"/>
           </a:p>
@@ -893,7 +905,7 @@
     </p:spTree>
     <p:extLst>
       <p:ext uri="{BB962C8B-B14F-4D97-AF65-F5344CB8AC3E}">
-        <p14:creationId xmlns:p14="http://schemas.microsoft.com/office/powerpoint/2010/main" val="3260853886"/>
+        <p14:creationId xmlns:p14="http://schemas.microsoft.com/office/powerpoint/2010/main" val="1284866668"/>
       </p:ext>
     </p:extLst>
   </p:cSld>
@@ -947,28 +959,7 @@
           <a:bodyPr/>
           <a:lstStyle/>
           <a:p>
-            <a:r>
-              <a:rPr lang="en-US" dirty="0"/>
-              <a:t>Ok, here’s a brain teaser.</a:t>
-            </a:r>
-          </a:p>
-          <a:p>
             <a:endParaRPr lang="en-US" dirty="0"/>
-          </a:p>
-          <a:p>
-            <a:r>
-              <a:rPr lang="en-US" dirty="0"/>
-              <a:t>We have a single number, and two vectors.</a:t>
-            </a:r>
-          </a:p>
-          <a:p>
-            <a:endParaRPr lang="en-US" dirty="0"/>
-          </a:p>
-          <a:p>
-            <a:r>
-              <a:rPr lang="en-US" dirty="0"/>
-              <a:t>What happens when we add them all together?</a:t>
-            </a:r>
           </a:p>
         </p:txBody>
       </p:sp>
@@ -989,7 +980,7 @@
           <a:p>
             <a:fld id="{4D7B2489-0EE5-4C7F-94A6-A858195D0567}" type="slidenum">
               <a:rPr lang="en-US" smtClean="0"/>
-              <a:t>14</a:t>
+              <a:t>13</a:t>
             </a:fld>
             <a:endParaRPr lang="en-US"/>
           </a:p>
@@ -998,7 +989,7 @@
     </p:spTree>
     <p:extLst>
       <p:ext uri="{BB962C8B-B14F-4D97-AF65-F5344CB8AC3E}">
-        <p14:creationId xmlns:p14="http://schemas.microsoft.com/office/powerpoint/2010/main" val="2144586236"/>
+        <p14:creationId xmlns:p14="http://schemas.microsoft.com/office/powerpoint/2010/main" val="3260853886"/>
       </p:ext>
     </p:extLst>
   </p:cSld>
@@ -1054,7 +1045,7 @@
           <a:p>
             <a:r>
               <a:rPr lang="en-US" dirty="0"/>
-              <a:t>Ok, here’s a brain teaser.</a:t>
+              <a:t>How about this one?</a:t>
             </a:r>
           </a:p>
           <a:p>
@@ -1063,16 +1054,7 @@
           <a:p>
             <a:r>
               <a:rPr lang="en-US" dirty="0"/>
-              <a:t>We have a single number, and two vectors.</a:t>
-            </a:r>
-          </a:p>
-          <a:p>
-            <a:endParaRPr lang="en-US" dirty="0"/>
-          </a:p>
-          <a:p>
-            <a:r>
-              <a:rPr lang="en-US" dirty="0"/>
-              <a:t>What happens when we add them all together?</a:t>
+              <a:t>Same two vectors from before, but now we add a single number.</a:t>
             </a:r>
           </a:p>
         </p:txBody>
@@ -1094,7 +1076,7 @@
           <a:p>
             <a:fld id="{4D7B2489-0EE5-4C7F-94A6-A858195D0567}" type="slidenum">
               <a:rPr lang="en-US" smtClean="0"/>
-              <a:t>15</a:t>
+              <a:t>14</a:t>
             </a:fld>
             <a:endParaRPr lang="en-US"/>
           </a:p>
@@ -1103,7 +1085,7 @@
     </p:spTree>
     <p:extLst>
       <p:ext uri="{BB962C8B-B14F-4D97-AF65-F5344CB8AC3E}">
-        <p14:creationId xmlns:p14="http://schemas.microsoft.com/office/powerpoint/2010/main" val="6446530"/>
+        <p14:creationId xmlns:p14="http://schemas.microsoft.com/office/powerpoint/2010/main" val="2144586236"/>
       </p:ext>
     </p:extLst>
   </p:cSld>
@@ -1157,25 +1139,7 @@
           <a:bodyPr/>
           <a:lstStyle/>
           <a:p>
-            <a:r>
-              <a:rPr lang="en-US" dirty="0"/>
-              <a:t>Another tool is the colon operator, which makes an integer sequence</a:t>
-            </a:r>
-          </a:p>
-          <a:p>
             <a:endParaRPr lang="en-US" dirty="0"/>
-          </a:p>
-          <a:p>
-            <a:r>
-              <a:rPr lang="en-US" dirty="0"/>
-              <a:t>Oh, and remember that [1] thing in square brackets we kept seeing?  Now what do you think it means?</a:t>
-            </a:r>
-          </a:p>
-          <a:p>
-            <a:r>
-              <a:rPr lang="en-US" dirty="0"/>
-              <a:t>It’s just saying where each line of printed output starts!</a:t>
-            </a:r>
           </a:p>
         </p:txBody>
       </p:sp>
@@ -1196,7 +1160,7 @@
           <a:p>
             <a:fld id="{4D7B2489-0EE5-4C7F-94A6-A858195D0567}" type="slidenum">
               <a:rPr lang="en-US" smtClean="0"/>
-              <a:t>16</a:t>
+              <a:t>15</a:t>
             </a:fld>
             <a:endParaRPr lang="en-US"/>
           </a:p>
@@ -1205,7 +1169,7 @@
     </p:spTree>
     <p:extLst>
       <p:ext uri="{BB962C8B-B14F-4D97-AF65-F5344CB8AC3E}">
-        <p14:creationId xmlns:p14="http://schemas.microsoft.com/office/powerpoint/2010/main" val="106737042"/>
+        <p14:creationId xmlns:p14="http://schemas.microsoft.com/office/powerpoint/2010/main" val="6446530"/>
       </p:ext>
     </p:extLst>
   </p:cSld>
@@ -1261,7 +1225,7 @@
           <a:p>
             <a:r>
               <a:rPr lang="en-US" dirty="0"/>
-              <a:t>The seq() function…</a:t>
+              <a:t>Here’s a couple more ways of making a vector from scratch…</a:t>
             </a:r>
           </a:p>
           <a:p>
@@ -1270,25 +1234,22 @@
           <a:p>
             <a:r>
               <a:rPr lang="en-US" dirty="0"/>
-              <a:t>Now before you try memorizing all the different arguments you see here, I actually want to call attention to two things:</a:t>
-            </a:r>
+              <a:t>Another tool is the colon operator, which makes an integer sequence</a:t>
+            </a:r>
+          </a:p>
+          <a:p>
+            <a:endParaRPr lang="en-US" dirty="0"/>
           </a:p>
           <a:p>
             <a:r>
               <a:rPr lang="en-US" dirty="0"/>
-              <a:t>- there’s often multiple ways of doing the same thing</a:t>
+              <a:t>Oh, and remember that [1] thing in square brackets we kept seeing?  Now what do you think it means?</a:t>
             </a:r>
           </a:p>
           <a:p>
             <a:r>
               <a:rPr lang="en-US" dirty="0"/>
-              <a:t>- functions can have multiple possible arguments</a:t>
-            </a:r>
-          </a:p>
-          <a:p>
-            <a:r>
-              <a:rPr lang="en-US" dirty="0"/>
-              <a:t>- …and you may have noticed in the second line I didn’t explicitly use from= and to=, but the function knew what I meant from the position</a:t>
+              <a:t>It’s just saying where each line of printed output starts!</a:t>
             </a:r>
           </a:p>
         </p:txBody>
@@ -1310,7 +1271,7 @@
           <a:p>
             <a:fld id="{4D7B2489-0EE5-4C7F-94A6-A858195D0567}" type="slidenum">
               <a:rPr lang="en-US" smtClean="0"/>
-              <a:t>17</a:t>
+              <a:t>16</a:t>
             </a:fld>
             <a:endParaRPr lang="en-US"/>
           </a:p>
@@ -1319,7 +1280,7 @@
     </p:spTree>
     <p:extLst>
       <p:ext uri="{BB962C8B-B14F-4D97-AF65-F5344CB8AC3E}">
-        <p14:creationId xmlns:p14="http://schemas.microsoft.com/office/powerpoint/2010/main" val="2555887919"/>
+        <p14:creationId xmlns:p14="http://schemas.microsoft.com/office/powerpoint/2010/main" val="106737042"/>
       </p:ext>
     </p:extLst>
   </p:cSld>
@@ -1375,7 +1336,28 @@
           <a:p>
             <a:r>
               <a:rPr lang="en-US" dirty="0"/>
-              <a:t>And thankfully, you don’t have to memorize all the things, because there is HELP!</a:t>
+              <a:t>The seq() function…</a:t>
+            </a:r>
+          </a:p>
+          <a:p>
+            <a:endParaRPr lang="en-US" dirty="0"/>
+          </a:p>
+          <a:p>
+            <a:r>
+              <a:rPr lang="en-US" dirty="0"/>
+              <a:t>Now before you try memorizing all the different arguments you see here, I actually want to call attention to two things:</a:t>
+            </a:r>
+          </a:p>
+          <a:p>
+            <a:r>
+              <a:rPr lang="en-US" dirty="0"/>
+              <a:t>- there’s often multiple ways of doing the same thing</a:t>
+            </a:r>
+          </a:p>
+          <a:p>
+            <a:r>
+              <a:rPr lang="en-US" dirty="0"/>
+              <a:t>- functions can have multiple possible arguments</a:t>
             </a:r>
           </a:p>
         </p:txBody>
@@ -1397,7 +1379,7 @@
           <a:p>
             <a:fld id="{4D7B2489-0EE5-4C7F-94A6-A858195D0567}" type="slidenum">
               <a:rPr lang="en-US" smtClean="0"/>
-              <a:t>18</a:t>
+              <a:t>17</a:t>
             </a:fld>
             <a:endParaRPr lang="en-US"/>
           </a:p>
@@ -1406,7 +1388,7 @@
     </p:spTree>
     <p:extLst>
       <p:ext uri="{BB962C8B-B14F-4D97-AF65-F5344CB8AC3E}">
-        <p14:creationId xmlns:p14="http://schemas.microsoft.com/office/powerpoint/2010/main" val="1852754370"/>
+        <p14:creationId xmlns:p14="http://schemas.microsoft.com/office/powerpoint/2010/main" val="2555887919"/>
       </p:ext>
     </p:extLst>
   </p:cSld>
@@ -1462,22 +1444,7 @@
           <a:p>
             <a:r>
               <a:rPr lang="en-US" dirty="0"/>
-              <a:t>Ok, so let’s build the vocabulary a little.</a:t>
-            </a:r>
-          </a:p>
-          <a:p>
-            <a:endParaRPr lang="en-US" dirty="0"/>
-          </a:p>
-          <a:p>
-            <a:r>
-              <a:rPr lang="en-US" dirty="0"/>
-              <a:t>We have all the math things: addition, subtraction, multiplication, division, and exponents</a:t>
-            </a:r>
-          </a:p>
-          <a:p>
-            <a:r>
-              <a:rPr lang="en-US" dirty="0"/>
-              <a:t>We can also use parentheses as needed when we’re doing math</a:t>
+              <a:t>And thankfully, you don’t have to memorize all the things, because there is HELP!</a:t>
             </a:r>
           </a:p>
         </p:txBody>
@@ -1499,7 +1466,7 @@
           <a:p>
             <a:fld id="{4D7B2489-0EE5-4C7F-94A6-A858195D0567}" type="slidenum">
               <a:rPr lang="en-US" smtClean="0"/>
-              <a:t>19</a:t>
+              <a:t>18</a:t>
             </a:fld>
             <a:endParaRPr lang="en-US"/>
           </a:p>
@@ -1508,7 +1475,7 @@
     </p:spTree>
     <p:extLst>
       <p:ext uri="{BB962C8B-B14F-4D97-AF65-F5344CB8AC3E}">
-        <p14:creationId xmlns:p14="http://schemas.microsoft.com/office/powerpoint/2010/main" val="774226052"/>
+        <p14:creationId xmlns:p14="http://schemas.microsoft.com/office/powerpoint/2010/main" val="1852754370"/>
       </p:ext>
     </p:extLst>
   </p:cSld>
@@ -1564,7 +1531,7 @@
           <a:p>
             <a:r>
               <a:rPr lang="en-US" dirty="0"/>
-              <a:t>A few more math things: square root, log, exponential, absolute value</a:t>
+              <a:t>Ok, so let’s build the vocabulary a little.</a:t>
             </a:r>
           </a:p>
           <a:p>
@@ -1573,13 +1540,13 @@
           <a:p>
             <a:r>
               <a:rPr lang="en-US" dirty="0"/>
-              <a:t>Notice that when we put a vector in, we get a vector out.</a:t>
+              <a:t>We have all the math things: addition, subtraction, multiplication, division, and exponents</a:t>
             </a:r>
           </a:p>
           <a:p>
             <a:r>
               <a:rPr lang="en-US" dirty="0"/>
-              <a:t>You’ll also notice we had to tell R that it was a vector!  How did we do that?</a:t>
+              <a:t>We can also use parentheses as needed when we’re doing math</a:t>
             </a:r>
           </a:p>
         </p:txBody>
@@ -1601,7 +1568,7 @@
           <a:p>
             <a:fld id="{4D7B2489-0EE5-4C7F-94A6-A858195D0567}" type="slidenum">
               <a:rPr lang="en-US" smtClean="0"/>
-              <a:t>20</a:t>
+              <a:t>19</a:t>
             </a:fld>
             <a:endParaRPr lang="en-US"/>
           </a:p>
@@ -1610,7 +1577,7 @@
     </p:spTree>
     <p:extLst>
       <p:ext uri="{BB962C8B-B14F-4D97-AF65-F5344CB8AC3E}">
-        <p14:creationId xmlns:p14="http://schemas.microsoft.com/office/powerpoint/2010/main" val="3672037594"/>
+        <p14:creationId xmlns:p14="http://schemas.microsoft.com/office/powerpoint/2010/main" val="774226052"/>
       </p:ext>
     </p:extLst>
   </p:cSld>
@@ -1753,13 +1720,22 @@
           <a:p>
             <a:r>
               <a:rPr lang="en-US" dirty="0"/>
-              <a:t>A few more math things that only make sense with a vector input</a:t>
-            </a:r>
+              <a:t>A few more math things: square root, log, exponential, absolute value</a:t>
+            </a:r>
+          </a:p>
+          <a:p>
+            <a:endParaRPr lang="en-US" dirty="0"/>
           </a:p>
           <a:p>
             <a:r>
               <a:rPr lang="en-US" dirty="0"/>
-              <a:t>Sum, product, mean, median, quantile, standard deviation, and variance</a:t>
+              <a:t>Notice that when we put a vector in, we get a vector out.</a:t>
+            </a:r>
+          </a:p>
+          <a:p>
+            <a:r>
+              <a:rPr lang="en-US" dirty="0"/>
+              <a:t>You’ll also notice we had to tell R that it was a vector!  How did we do that?</a:t>
             </a:r>
           </a:p>
         </p:txBody>
@@ -1781,7 +1757,7 @@
           <a:p>
             <a:fld id="{4D7B2489-0EE5-4C7F-94A6-A858195D0567}" type="slidenum">
               <a:rPr lang="en-US" smtClean="0"/>
-              <a:t>21</a:t>
+              <a:t>20</a:t>
             </a:fld>
             <a:endParaRPr lang="en-US"/>
           </a:p>
@@ -1790,7 +1766,7 @@
     </p:spTree>
     <p:extLst>
       <p:ext uri="{BB962C8B-B14F-4D97-AF65-F5344CB8AC3E}">
-        <p14:creationId xmlns:p14="http://schemas.microsoft.com/office/powerpoint/2010/main" val="2604631203"/>
+        <p14:creationId xmlns:p14="http://schemas.microsoft.com/office/powerpoint/2010/main" val="3672037594"/>
       </p:ext>
     </p:extLst>
   </p:cSld>
@@ -1846,25 +1822,13 @@
           <a:p>
             <a:r>
               <a:rPr lang="en-US" dirty="0"/>
-              <a:t>So far we’ve just seen numbers, but R can also store other things</a:t>
-            </a:r>
-          </a:p>
-          <a:p>
-            <a:endParaRPr lang="en-US" dirty="0"/>
+              <a:t>A few more math things that only make sense with a vector input</a:t>
+            </a:r>
           </a:p>
           <a:p>
             <a:r>
               <a:rPr lang="en-US" dirty="0"/>
-              <a:t>Logical is simpler, it can only be TRUE or FALSE</a:t>
-            </a:r>
-          </a:p>
-          <a:p>
-            <a:endParaRPr lang="en-US" dirty="0"/>
-          </a:p>
-          <a:p>
-            <a:r>
-              <a:rPr lang="en-US" dirty="0"/>
-              <a:t>With Character, you can store text</a:t>
+              <a:t>Sum, product, mean, median, quantile, standard deviation, and variance</a:t>
             </a:r>
           </a:p>
         </p:txBody>
@@ -1886,7 +1850,7 @@
           <a:p>
             <a:fld id="{4D7B2489-0EE5-4C7F-94A6-A858195D0567}" type="slidenum">
               <a:rPr lang="en-US" smtClean="0"/>
-              <a:t>23</a:t>
+              <a:t>21</a:t>
             </a:fld>
             <a:endParaRPr lang="en-US"/>
           </a:p>
@@ -1895,7 +1859,7 @@
     </p:spTree>
     <p:extLst>
       <p:ext uri="{BB962C8B-B14F-4D97-AF65-F5344CB8AC3E}">
-        <p14:creationId xmlns:p14="http://schemas.microsoft.com/office/powerpoint/2010/main" val="1797278814"/>
+        <p14:creationId xmlns:p14="http://schemas.microsoft.com/office/powerpoint/2010/main" val="2604631203"/>
       </p:ext>
     </p:extLst>
   </p:cSld>
@@ -1951,16 +1915,7 @@
           <a:p>
             <a:r>
               <a:rPr lang="en-US" dirty="0"/>
-              <a:t>And it’s generally pretty intuitive what can and can’t happen…</a:t>
-            </a:r>
-          </a:p>
-          <a:p>
-            <a:endParaRPr lang="en-US" dirty="0"/>
-          </a:p>
-          <a:p>
-            <a:r>
-              <a:rPr lang="en-US" dirty="0"/>
-              <a:t>Notice that wrapping “2” in quotes tells R to treat it as Character</a:t>
+              <a:t>An important R thing we need to talk about is NA, which is R’s way of handling blanks.</a:t>
             </a:r>
           </a:p>
         </p:txBody>
@@ -1982,7 +1937,7 @@
           <a:p>
             <a:fld id="{4D7B2489-0EE5-4C7F-94A6-A858195D0567}" type="slidenum">
               <a:rPr lang="en-US" smtClean="0"/>
-              <a:t>24</a:t>
+              <a:t>22</a:t>
             </a:fld>
             <a:endParaRPr lang="en-US"/>
           </a:p>
@@ -1991,7 +1946,7 @@
     </p:spTree>
     <p:extLst>
       <p:ext uri="{BB962C8B-B14F-4D97-AF65-F5344CB8AC3E}">
-        <p14:creationId xmlns:p14="http://schemas.microsoft.com/office/powerpoint/2010/main" val="2995199807"/>
+        <p14:creationId xmlns:p14="http://schemas.microsoft.com/office/powerpoint/2010/main" val="2880662153"/>
       </p:ext>
     </p:extLst>
   </p:cSld>
@@ -2047,7 +2002,34 @@
           <a:p>
             <a:r>
               <a:rPr lang="en-US" dirty="0"/>
-              <a:t>…lets look at what happens here</a:t>
+              <a:t>So far we’ve just seen numbers, but R can also store other things</a:t>
+            </a:r>
+          </a:p>
+          <a:p>
+            <a:endParaRPr lang="en-US" dirty="0"/>
+          </a:p>
+          <a:p>
+            <a:r>
+              <a:rPr lang="en-US" dirty="0"/>
+              <a:t>Logical is simpler, it can only be TRUE or FALSE</a:t>
+            </a:r>
+          </a:p>
+          <a:p>
+            <a:endParaRPr lang="en-US" dirty="0"/>
+          </a:p>
+          <a:p>
+            <a:r>
+              <a:rPr lang="en-US" dirty="0"/>
+              <a:t>With Character, you can store text</a:t>
+            </a:r>
+          </a:p>
+          <a:p>
+            <a:endParaRPr lang="en-US" dirty="0"/>
+          </a:p>
+          <a:p>
+            <a:r>
+              <a:rPr lang="en-US" dirty="0"/>
+              <a:t>And things can be changed into a MORE COMPLEX class without losing information.  …which will make sense in a moment.</a:t>
             </a:r>
           </a:p>
         </p:txBody>
@@ -2069,7 +2051,7 @@
           <a:p>
             <a:fld id="{4D7B2489-0EE5-4C7F-94A6-A858195D0567}" type="slidenum">
               <a:rPr lang="en-US" smtClean="0"/>
-              <a:t>25</a:t>
+              <a:t>23</a:t>
             </a:fld>
             <a:endParaRPr lang="en-US"/>
           </a:p>
@@ -2078,7 +2060,7 @@
     </p:spTree>
     <p:extLst>
       <p:ext uri="{BB962C8B-B14F-4D97-AF65-F5344CB8AC3E}">
-        <p14:creationId xmlns:p14="http://schemas.microsoft.com/office/powerpoint/2010/main" val="416981613"/>
+        <p14:creationId xmlns:p14="http://schemas.microsoft.com/office/powerpoint/2010/main" val="1797278814"/>
       </p:ext>
     </p:extLst>
   </p:cSld>
@@ -2134,7 +2116,7 @@
           <a:p>
             <a:r>
               <a:rPr lang="en-US" dirty="0"/>
-              <a:t>…so here we see this Character vector we made a couple slides ago</a:t>
+              <a:t>But first …  it’s generally pretty intuitive what can and can’t happen…</a:t>
             </a:r>
           </a:p>
           <a:p>
@@ -2143,7 +2125,7 @@
           <a:p>
             <a:r>
               <a:rPr lang="en-US" dirty="0"/>
-              <a:t>And when we turn it back to numeric, it doesn’t know what to do with the last element</a:t>
+              <a:t>Notice that wrapping “2” in quotes tells R to treat it as Character</a:t>
             </a:r>
           </a:p>
         </p:txBody>
@@ -2165,7 +2147,7 @@
           <a:p>
             <a:fld id="{4D7B2489-0EE5-4C7F-94A6-A858195D0567}" type="slidenum">
               <a:rPr lang="en-US" smtClean="0"/>
-              <a:t>28</a:t>
+              <a:t>24</a:t>
             </a:fld>
             <a:endParaRPr lang="en-US"/>
           </a:p>
@@ -2174,7 +2156,7 @@
     </p:spTree>
     <p:extLst>
       <p:ext uri="{BB962C8B-B14F-4D97-AF65-F5344CB8AC3E}">
-        <p14:creationId xmlns:p14="http://schemas.microsoft.com/office/powerpoint/2010/main" val="2843340191"/>
+        <p14:creationId xmlns:p14="http://schemas.microsoft.com/office/powerpoint/2010/main" val="2995199807"/>
       </p:ext>
     </p:extLst>
   </p:cSld>
@@ -2230,31 +2212,7 @@
           <a:p>
             <a:r>
               <a:rPr lang="en-US" dirty="0"/>
-              <a:t>One last vector class that can be useful if you’re working with DISTINCT CATEGORIES is Factor</a:t>
-            </a:r>
-          </a:p>
-          <a:p>
-            <a:endParaRPr lang="en-US" dirty="0"/>
-          </a:p>
-          <a:p>
-            <a:r>
-              <a:rPr lang="en-US" dirty="0"/>
-              <a:t>So we created a vector of field techs two ways: look at the difference in how R behaves</a:t>
-            </a:r>
-          </a:p>
-          <a:p>
-            <a:r>
-              <a:rPr lang="en-US" dirty="0"/>
-              <a:t>- the Factor version carries another piece of information: what categories are allowed</a:t>
-            </a:r>
-          </a:p>
-          <a:p>
-            <a:endParaRPr lang="en-US" dirty="0"/>
-          </a:p>
-          <a:p>
-            <a:r>
-              <a:rPr lang="en-US" dirty="0"/>
-              <a:t>And this is a little odd: look at what happens when you covert this to numeric</a:t>
+              <a:t>…lets look at what happens here</a:t>
             </a:r>
           </a:p>
         </p:txBody>
@@ -2276,7 +2234,7 @@
           <a:p>
             <a:fld id="{4D7B2489-0EE5-4C7F-94A6-A858195D0567}" type="slidenum">
               <a:rPr lang="en-US" smtClean="0"/>
-              <a:t>29</a:t>
+              <a:t>25</a:t>
             </a:fld>
             <a:endParaRPr lang="en-US"/>
           </a:p>
@@ -2285,7 +2243,7 @@
     </p:spTree>
     <p:extLst>
       <p:ext uri="{BB962C8B-B14F-4D97-AF65-F5344CB8AC3E}">
-        <p14:creationId xmlns:p14="http://schemas.microsoft.com/office/powerpoint/2010/main" val="1143673571"/>
+        <p14:creationId xmlns:p14="http://schemas.microsoft.com/office/powerpoint/2010/main" val="416981613"/>
       </p:ext>
     </p:extLst>
   </p:cSld>
@@ -2341,7 +2299,16 @@
           <a:p>
             <a:r>
               <a:rPr lang="en-US" dirty="0"/>
-              <a:t>Alright!  Let’s revisit the main points to take away.</a:t>
+              <a:t>Maybe more importantly….</a:t>
+            </a:r>
+          </a:p>
+          <a:p>
+            <a:endParaRPr lang="en-US" dirty="0"/>
+          </a:p>
+          <a:p>
+            <a:r>
+              <a:rPr lang="en-US" dirty="0"/>
+              <a:t>…and I put this one in bold because this is DIFFERENT FROM EXCEL!</a:t>
             </a:r>
           </a:p>
         </p:txBody>
@@ -2363,7 +2330,7 @@
           <a:p>
             <a:fld id="{4D7B2489-0EE5-4C7F-94A6-A858195D0567}" type="slidenum">
               <a:rPr lang="en-US" smtClean="0"/>
-              <a:t>30</a:t>
+              <a:t>26</a:t>
             </a:fld>
             <a:endParaRPr lang="en-US"/>
           </a:p>
@@ -2372,7 +2339,7 @@
     </p:spTree>
     <p:extLst>
       <p:ext uri="{BB962C8B-B14F-4D97-AF65-F5344CB8AC3E}">
-        <p14:creationId xmlns:p14="http://schemas.microsoft.com/office/powerpoint/2010/main" val="461412475"/>
+        <p14:creationId xmlns:p14="http://schemas.microsoft.com/office/powerpoint/2010/main" val="2231930002"/>
       </p:ext>
     </p:extLst>
   </p:cSld>
@@ -2428,7 +2395,7 @@
           <a:p>
             <a:r>
               <a:rPr lang="en-US" dirty="0"/>
-              <a:t>One special character that you should make friends with is this hashtag guy…</a:t>
+              <a:t>So to bring it all home, just remember:</a:t>
             </a:r>
           </a:p>
         </p:txBody>
@@ -2450,7 +2417,7 @@
           <a:p>
             <a:fld id="{4D7B2489-0EE5-4C7F-94A6-A858195D0567}" type="slidenum">
               <a:rPr lang="en-US" smtClean="0"/>
-              <a:t>31</a:t>
+              <a:t>27</a:t>
             </a:fld>
             <a:endParaRPr lang="en-US"/>
           </a:p>
@@ -2459,7 +2426,7 @@
     </p:spTree>
     <p:extLst>
       <p:ext uri="{BB962C8B-B14F-4D97-AF65-F5344CB8AC3E}">
-        <p14:creationId xmlns:p14="http://schemas.microsoft.com/office/powerpoint/2010/main" val="2944637661"/>
+        <p14:creationId xmlns:p14="http://schemas.microsoft.com/office/powerpoint/2010/main" val="1994883717"/>
       </p:ext>
     </p:extLst>
   </p:cSld>
@@ -2515,7 +2482,7 @@
           <a:p>
             <a:r>
               <a:rPr lang="en-US" dirty="0"/>
-              <a:t>On the topic of descriptive names, there are a few things you can and can’t do.</a:t>
+              <a:t>And I can feel you asking: YES, we can change classes manually.  Mostly.</a:t>
             </a:r>
           </a:p>
           <a:p>
@@ -2524,7 +2491,16 @@
           <a:p>
             <a:r>
               <a:rPr lang="en-US" dirty="0"/>
-              <a:t>And some things that are worth doing, because we can.</a:t>
+              <a:t>…so here we see this Character vector we made a couple slides ago</a:t>
+            </a:r>
+          </a:p>
+          <a:p>
+            <a:endParaRPr lang="en-US" dirty="0"/>
+          </a:p>
+          <a:p>
+            <a:r>
+              <a:rPr lang="en-US" dirty="0"/>
+              <a:t>And when we turn it back to numeric, it doesn’t know what to do with the last element</a:t>
             </a:r>
           </a:p>
         </p:txBody>
@@ -2546,7 +2522,7 @@
           <a:p>
             <a:fld id="{4D7B2489-0EE5-4C7F-94A6-A858195D0567}" type="slidenum">
               <a:rPr lang="en-US" smtClean="0"/>
-              <a:t>33</a:t>
+              <a:t>28</a:t>
             </a:fld>
             <a:endParaRPr lang="en-US"/>
           </a:p>
@@ -2555,7 +2531,7 @@
     </p:spTree>
     <p:extLst>
       <p:ext uri="{BB962C8B-B14F-4D97-AF65-F5344CB8AC3E}">
-        <p14:creationId xmlns:p14="http://schemas.microsoft.com/office/powerpoint/2010/main" val="3117339836"/>
+        <p14:creationId xmlns:p14="http://schemas.microsoft.com/office/powerpoint/2010/main" val="2843340191"/>
       </p:ext>
     </p:extLst>
   </p:cSld>
@@ -2611,7 +2587,31 @@
           <a:p>
             <a:r>
               <a:rPr lang="en-US" dirty="0"/>
-              <a:t>Alright!  Let’s revisit the main points to take away.</a:t>
+              <a:t>One last vector class that can be useful if you’re working with DISTINCT CATEGORIES is Factor</a:t>
+            </a:r>
+          </a:p>
+          <a:p>
+            <a:endParaRPr lang="en-US" dirty="0"/>
+          </a:p>
+          <a:p>
+            <a:r>
+              <a:rPr lang="en-US" dirty="0"/>
+              <a:t>So we created a vector of field techs two ways: look at the difference in how R behaves</a:t>
+            </a:r>
+          </a:p>
+          <a:p>
+            <a:r>
+              <a:rPr lang="en-US" dirty="0"/>
+              <a:t>- the Factor version carries another piece of information: what categories are allowed</a:t>
+            </a:r>
+          </a:p>
+          <a:p>
+            <a:endParaRPr lang="en-US" dirty="0"/>
+          </a:p>
+          <a:p>
+            <a:r>
+              <a:rPr lang="en-US" dirty="0"/>
+              <a:t>And this is a little odd: look at what happens when you covert this to numeric</a:t>
             </a:r>
           </a:p>
         </p:txBody>
@@ -2633,7 +2633,7 @@
           <a:p>
             <a:fld id="{4D7B2489-0EE5-4C7F-94A6-A858195D0567}" type="slidenum">
               <a:rPr lang="en-US" smtClean="0"/>
-              <a:t>34</a:t>
+              <a:t>29</a:t>
             </a:fld>
             <a:endParaRPr lang="en-US"/>
           </a:p>
@@ -2642,7 +2642,7 @@
     </p:spTree>
     <p:extLst>
       <p:ext uri="{BB962C8B-B14F-4D97-AF65-F5344CB8AC3E}">
-        <p14:creationId xmlns:p14="http://schemas.microsoft.com/office/powerpoint/2010/main" val="343931581"/>
+        <p14:creationId xmlns:p14="http://schemas.microsoft.com/office/powerpoint/2010/main" val="1143673571"/>
       </p:ext>
     </p:extLst>
   </p:cSld>
@@ -2707,7 +2707,7 @@
           <a:p>
             <a:r>
               <a:rPr lang="en-US" dirty="0"/>
-              <a:t>You can even think of R like a calculator: Each line can be its own operation, which takes the pressure off!  You don’t have to write a complete “program” </a:t>
+              <a:t>You can even think of R like a calculator: Each line can be its own operation, which takes the pressure off!  You don’t have to write a complete “program” to see results</a:t>
             </a:r>
           </a:p>
         </p:txBody>
@@ -2739,6 +2739,456 @@
     <p:extLst>
       <p:ext uri="{BB962C8B-B14F-4D97-AF65-F5344CB8AC3E}">
         <p14:creationId xmlns:p14="http://schemas.microsoft.com/office/powerpoint/2010/main" val="3001759290"/>
+      </p:ext>
+    </p:extLst>
+  </p:cSld>
+  <p:clrMapOvr>
+    <a:masterClrMapping/>
+  </p:clrMapOvr>
+</p:notes>
+</file>
+
+<file path=ppt/notesSlides/notesSlide30.xml><?xml version="1.0" encoding="utf-8"?>
+<p:notes xmlns:a="http://schemas.openxmlformats.org/drawingml/2006/main" xmlns:r="http://schemas.openxmlformats.org/officeDocument/2006/relationships" xmlns:p="http://schemas.openxmlformats.org/presentationml/2006/main">
+  <p:cSld>
+    <p:spTree>
+      <p:nvGrpSpPr>
+        <p:cNvPr id="1" name=""/>
+        <p:cNvGrpSpPr/>
+        <p:nvPr/>
+      </p:nvGrpSpPr>
+      <p:grpSpPr>
+        <a:xfrm>
+          <a:off x="0" y="0"/>
+          <a:ext cx="0" cy="0"/>
+          <a:chOff x="0" y="0"/>
+          <a:chExt cx="0" cy="0"/>
+        </a:xfrm>
+      </p:grpSpPr>
+      <p:sp>
+        <p:nvSpPr>
+          <p:cNvPr id="2" name="Slide Image Placeholder 1"/>
+          <p:cNvSpPr>
+            <a:spLocks noGrp="1" noRot="1" noChangeAspect="1"/>
+          </p:cNvSpPr>
+          <p:nvPr>
+            <p:ph type="sldImg"/>
+          </p:nvPr>
+        </p:nvSpPr>
+        <p:spPr/>
+      </p:sp>
+      <p:sp>
+        <p:nvSpPr>
+          <p:cNvPr id="3" name="Notes Placeholder 2"/>
+          <p:cNvSpPr>
+            <a:spLocks noGrp="1"/>
+          </p:cNvSpPr>
+          <p:nvPr>
+            <p:ph type="body" idx="1"/>
+          </p:nvPr>
+        </p:nvSpPr>
+        <p:spPr/>
+        <p:txBody>
+          <a:bodyPr/>
+          <a:lstStyle/>
+          <a:p>
+            <a:r>
+              <a:rPr lang="en-US" dirty="0"/>
+              <a:t>This might feel like splitting hairs, but since we’re talking about the differences, we should probably talk about when to use which.</a:t>
+            </a:r>
+          </a:p>
+          <a:p>
+            <a:endParaRPr lang="en-US" dirty="0"/>
+          </a:p>
+          <a:p>
+            <a:r>
+              <a:rPr lang="en-US" dirty="0"/>
+              <a:t>But IN PRACTICE, it actually matters a little less than it might seem</a:t>
+            </a:r>
+          </a:p>
+        </p:txBody>
+      </p:sp>
+      <p:sp>
+        <p:nvSpPr>
+          <p:cNvPr id="4" name="Slide Number Placeholder 3"/>
+          <p:cNvSpPr>
+            <a:spLocks noGrp="1"/>
+          </p:cNvSpPr>
+          <p:nvPr>
+            <p:ph type="sldNum" sz="quarter" idx="5"/>
+          </p:nvPr>
+        </p:nvSpPr>
+        <p:spPr/>
+        <p:txBody>
+          <a:bodyPr/>
+          <a:lstStyle/>
+          <a:p>
+            <a:fld id="{4D7B2489-0EE5-4C7F-94A6-A858195D0567}" type="slidenum">
+              <a:rPr lang="en-US" smtClean="0"/>
+              <a:t>30</a:t>
+            </a:fld>
+            <a:endParaRPr lang="en-US"/>
+          </a:p>
+        </p:txBody>
+      </p:sp>
+    </p:spTree>
+    <p:extLst>
+      <p:ext uri="{BB962C8B-B14F-4D97-AF65-F5344CB8AC3E}">
+        <p14:creationId xmlns:p14="http://schemas.microsoft.com/office/powerpoint/2010/main" val="461412475"/>
+      </p:ext>
+    </p:extLst>
+  </p:cSld>
+  <p:clrMapOvr>
+    <a:masterClrMapping/>
+  </p:clrMapOvr>
+</p:notes>
+</file>
+
+<file path=ppt/notesSlides/notesSlide31.xml><?xml version="1.0" encoding="utf-8"?>
+<p:notes xmlns:a="http://schemas.openxmlformats.org/drawingml/2006/main" xmlns:r="http://schemas.openxmlformats.org/officeDocument/2006/relationships" xmlns:p="http://schemas.openxmlformats.org/presentationml/2006/main">
+  <p:cSld>
+    <p:spTree>
+      <p:nvGrpSpPr>
+        <p:cNvPr id="1" name=""/>
+        <p:cNvGrpSpPr/>
+        <p:nvPr/>
+      </p:nvGrpSpPr>
+      <p:grpSpPr>
+        <a:xfrm>
+          <a:off x="0" y="0"/>
+          <a:ext cx="0" cy="0"/>
+          <a:chOff x="0" y="0"/>
+          <a:chExt cx="0" cy="0"/>
+        </a:xfrm>
+      </p:grpSpPr>
+      <p:sp>
+        <p:nvSpPr>
+          <p:cNvPr id="2" name="Slide Image Placeholder 1"/>
+          <p:cNvSpPr>
+            <a:spLocks noGrp="1" noRot="1" noChangeAspect="1"/>
+          </p:cNvSpPr>
+          <p:nvPr>
+            <p:ph type="sldImg"/>
+          </p:nvPr>
+        </p:nvSpPr>
+        <p:spPr/>
+      </p:sp>
+      <p:sp>
+        <p:nvSpPr>
+          <p:cNvPr id="3" name="Notes Placeholder 2"/>
+          <p:cNvSpPr>
+            <a:spLocks noGrp="1"/>
+          </p:cNvSpPr>
+          <p:nvPr>
+            <p:ph type="body" idx="1"/>
+          </p:nvPr>
+        </p:nvSpPr>
+        <p:spPr/>
+        <p:txBody>
+          <a:bodyPr/>
+          <a:lstStyle/>
+          <a:p>
+            <a:r>
+              <a:rPr lang="en-US" dirty="0"/>
+              <a:t>One special character that you should make friends with is this hashtag guy…</a:t>
+            </a:r>
+          </a:p>
+          <a:p>
+            <a:endParaRPr lang="en-US" dirty="0"/>
+          </a:p>
+          <a:p>
+            <a:r>
+              <a:rPr lang="en-US" dirty="0"/>
+              <a:t>And the way this works is that everything to the right of # is not evaluated</a:t>
+            </a:r>
+          </a:p>
+        </p:txBody>
+      </p:sp>
+      <p:sp>
+        <p:nvSpPr>
+          <p:cNvPr id="4" name="Slide Number Placeholder 3"/>
+          <p:cNvSpPr>
+            <a:spLocks noGrp="1"/>
+          </p:cNvSpPr>
+          <p:nvPr>
+            <p:ph type="sldNum" sz="quarter" idx="5"/>
+          </p:nvPr>
+        </p:nvSpPr>
+        <p:spPr/>
+        <p:txBody>
+          <a:bodyPr/>
+          <a:lstStyle/>
+          <a:p>
+            <a:fld id="{4D7B2489-0EE5-4C7F-94A6-A858195D0567}" type="slidenum">
+              <a:rPr lang="en-US" smtClean="0"/>
+              <a:t>31</a:t>
+            </a:fld>
+            <a:endParaRPr lang="en-US"/>
+          </a:p>
+        </p:txBody>
+      </p:sp>
+    </p:spTree>
+    <p:extLst>
+      <p:ext uri="{BB962C8B-B14F-4D97-AF65-F5344CB8AC3E}">
+        <p14:creationId xmlns:p14="http://schemas.microsoft.com/office/powerpoint/2010/main" val="2944637661"/>
+      </p:ext>
+    </p:extLst>
+  </p:cSld>
+  <p:clrMapOvr>
+    <a:masterClrMapping/>
+  </p:clrMapOvr>
+</p:notes>
+</file>
+
+<file path=ppt/notesSlides/notesSlide32.xml><?xml version="1.0" encoding="utf-8"?>
+<p:notes xmlns:a="http://schemas.openxmlformats.org/drawingml/2006/main" xmlns:r="http://schemas.openxmlformats.org/officeDocument/2006/relationships" xmlns:p="http://schemas.openxmlformats.org/presentationml/2006/main">
+  <p:cSld>
+    <p:spTree>
+      <p:nvGrpSpPr>
+        <p:cNvPr id="1" name=""/>
+        <p:cNvGrpSpPr/>
+        <p:nvPr/>
+      </p:nvGrpSpPr>
+      <p:grpSpPr>
+        <a:xfrm>
+          <a:off x="0" y="0"/>
+          <a:ext cx="0" cy="0"/>
+          <a:chOff x="0" y="0"/>
+          <a:chExt cx="0" cy="0"/>
+        </a:xfrm>
+      </p:grpSpPr>
+      <p:sp>
+        <p:nvSpPr>
+          <p:cNvPr id="2" name="Slide Image Placeholder 1"/>
+          <p:cNvSpPr>
+            <a:spLocks noGrp="1" noRot="1" noChangeAspect="1"/>
+          </p:cNvSpPr>
+          <p:nvPr>
+            <p:ph type="sldImg"/>
+          </p:nvPr>
+        </p:nvSpPr>
+        <p:spPr/>
+      </p:sp>
+      <p:sp>
+        <p:nvSpPr>
+          <p:cNvPr id="3" name="Notes Placeholder 2"/>
+          <p:cNvSpPr>
+            <a:spLocks noGrp="1"/>
+          </p:cNvSpPr>
+          <p:nvPr>
+            <p:ph type="body" idx="1"/>
+          </p:nvPr>
+        </p:nvSpPr>
+        <p:spPr/>
+        <p:txBody>
+          <a:bodyPr/>
+          <a:lstStyle/>
+          <a:p>
+            <a:r>
+              <a:rPr lang="en-US" dirty="0"/>
+              <a:t>Oh, and while we’re talking about readability, there are a few rules</a:t>
+            </a:r>
+          </a:p>
+        </p:txBody>
+      </p:sp>
+      <p:sp>
+        <p:nvSpPr>
+          <p:cNvPr id="4" name="Slide Number Placeholder 3"/>
+          <p:cNvSpPr>
+            <a:spLocks noGrp="1"/>
+          </p:cNvSpPr>
+          <p:nvPr>
+            <p:ph type="sldNum" sz="quarter" idx="5"/>
+          </p:nvPr>
+        </p:nvSpPr>
+        <p:spPr/>
+        <p:txBody>
+          <a:bodyPr/>
+          <a:lstStyle/>
+          <a:p>
+            <a:fld id="{4D7B2489-0EE5-4C7F-94A6-A858195D0567}" type="slidenum">
+              <a:rPr lang="en-US" smtClean="0"/>
+              <a:t>33</a:t>
+            </a:fld>
+            <a:endParaRPr lang="en-US"/>
+          </a:p>
+        </p:txBody>
+      </p:sp>
+    </p:spTree>
+    <p:extLst>
+      <p:ext uri="{BB962C8B-B14F-4D97-AF65-F5344CB8AC3E}">
+        <p14:creationId xmlns:p14="http://schemas.microsoft.com/office/powerpoint/2010/main" val="3117339836"/>
+      </p:ext>
+    </p:extLst>
+  </p:cSld>
+  <p:clrMapOvr>
+    <a:masterClrMapping/>
+  </p:clrMapOvr>
+</p:notes>
+</file>
+
+<file path=ppt/notesSlides/notesSlide33.xml><?xml version="1.0" encoding="utf-8"?>
+<p:notes xmlns:a="http://schemas.openxmlformats.org/drawingml/2006/main" xmlns:r="http://schemas.openxmlformats.org/officeDocument/2006/relationships" xmlns:p="http://schemas.openxmlformats.org/presentationml/2006/main">
+  <p:cSld>
+    <p:spTree>
+      <p:nvGrpSpPr>
+        <p:cNvPr id="1" name=""/>
+        <p:cNvGrpSpPr/>
+        <p:nvPr/>
+      </p:nvGrpSpPr>
+      <p:grpSpPr>
+        <a:xfrm>
+          <a:off x="0" y="0"/>
+          <a:ext cx="0" cy="0"/>
+          <a:chOff x="0" y="0"/>
+          <a:chExt cx="0" cy="0"/>
+        </a:xfrm>
+      </p:grpSpPr>
+      <p:sp>
+        <p:nvSpPr>
+          <p:cNvPr id="2" name="Slide Image Placeholder 1"/>
+          <p:cNvSpPr>
+            <a:spLocks noGrp="1" noRot="1" noChangeAspect="1"/>
+          </p:cNvSpPr>
+          <p:nvPr>
+            <p:ph type="sldImg"/>
+          </p:nvPr>
+        </p:nvSpPr>
+        <p:spPr/>
+      </p:sp>
+      <p:sp>
+        <p:nvSpPr>
+          <p:cNvPr id="3" name="Notes Placeholder 2"/>
+          <p:cNvSpPr>
+            <a:spLocks noGrp="1"/>
+          </p:cNvSpPr>
+          <p:nvPr>
+            <p:ph type="body" idx="1"/>
+          </p:nvPr>
+        </p:nvSpPr>
+        <p:spPr/>
+        <p:txBody>
+          <a:bodyPr/>
+          <a:lstStyle/>
+          <a:p>
+            <a:r>
+              <a:rPr lang="en-US" dirty="0"/>
+              <a:t>Alright!  Let’s revisit the main points we saw.</a:t>
+            </a:r>
+          </a:p>
+        </p:txBody>
+      </p:sp>
+      <p:sp>
+        <p:nvSpPr>
+          <p:cNvPr id="4" name="Slide Number Placeholder 3"/>
+          <p:cNvSpPr>
+            <a:spLocks noGrp="1"/>
+          </p:cNvSpPr>
+          <p:nvPr>
+            <p:ph type="sldNum" sz="quarter" idx="5"/>
+          </p:nvPr>
+        </p:nvSpPr>
+        <p:spPr/>
+        <p:txBody>
+          <a:bodyPr/>
+          <a:lstStyle/>
+          <a:p>
+            <a:fld id="{4D7B2489-0EE5-4C7F-94A6-A858195D0567}" type="slidenum">
+              <a:rPr lang="en-US" smtClean="0"/>
+              <a:t>34</a:t>
+            </a:fld>
+            <a:endParaRPr lang="en-US"/>
+          </a:p>
+        </p:txBody>
+      </p:sp>
+    </p:spTree>
+    <p:extLst>
+      <p:ext uri="{BB962C8B-B14F-4D97-AF65-F5344CB8AC3E}">
+        <p14:creationId xmlns:p14="http://schemas.microsoft.com/office/powerpoint/2010/main" val="343931581"/>
+      </p:ext>
+    </p:extLst>
+  </p:cSld>
+  <p:clrMapOvr>
+    <a:masterClrMapping/>
+  </p:clrMapOvr>
+</p:notes>
+</file>
+
+<file path=ppt/notesSlides/notesSlide34.xml><?xml version="1.0" encoding="utf-8"?>
+<p:notes xmlns:a="http://schemas.openxmlformats.org/drawingml/2006/main" xmlns:r="http://schemas.openxmlformats.org/officeDocument/2006/relationships" xmlns:p="http://schemas.openxmlformats.org/presentationml/2006/main">
+  <p:cSld>
+    <p:spTree>
+      <p:nvGrpSpPr>
+        <p:cNvPr id="1" name=""/>
+        <p:cNvGrpSpPr/>
+        <p:nvPr/>
+      </p:nvGrpSpPr>
+      <p:grpSpPr>
+        <a:xfrm>
+          <a:off x="0" y="0"/>
+          <a:ext cx="0" cy="0"/>
+          <a:chOff x="0" y="0"/>
+          <a:chExt cx="0" cy="0"/>
+        </a:xfrm>
+      </p:grpSpPr>
+      <p:sp>
+        <p:nvSpPr>
+          <p:cNvPr id="2" name="Slide Image Placeholder 1"/>
+          <p:cNvSpPr>
+            <a:spLocks noGrp="1" noRot="1" noChangeAspect="1"/>
+          </p:cNvSpPr>
+          <p:nvPr>
+            <p:ph type="sldImg"/>
+          </p:nvPr>
+        </p:nvSpPr>
+        <p:spPr/>
+      </p:sp>
+      <p:sp>
+        <p:nvSpPr>
+          <p:cNvPr id="3" name="Notes Placeholder 2"/>
+          <p:cNvSpPr>
+            <a:spLocks noGrp="1"/>
+          </p:cNvSpPr>
+          <p:nvPr>
+            <p:ph type="body" idx="1"/>
+          </p:nvPr>
+        </p:nvSpPr>
+        <p:spPr/>
+        <p:txBody>
+          <a:bodyPr/>
+          <a:lstStyle/>
+          <a:p>
+            <a:endParaRPr lang="en-US" dirty="0"/>
+          </a:p>
+        </p:txBody>
+      </p:sp>
+      <p:sp>
+        <p:nvSpPr>
+          <p:cNvPr id="4" name="Slide Number Placeholder 3"/>
+          <p:cNvSpPr>
+            <a:spLocks noGrp="1"/>
+          </p:cNvSpPr>
+          <p:nvPr>
+            <p:ph type="sldNum" sz="quarter" idx="5"/>
+          </p:nvPr>
+        </p:nvSpPr>
+        <p:spPr/>
+        <p:txBody>
+          <a:bodyPr/>
+          <a:lstStyle/>
+          <a:p>
+            <a:fld id="{4D7B2489-0EE5-4C7F-94A6-A858195D0567}" type="slidenum">
+              <a:rPr lang="en-US" smtClean="0"/>
+              <a:t>38</a:t>
+            </a:fld>
+            <a:endParaRPr lang="en-US"/>
+          </a:p>
+        </p:txBody>
+      </p:sp>
+    </p:spTree>
+    <p:extLst>
+      <p:ext uri="{BB962C8B-B14F-4D97-AF65-F5344CB8AC3E}">
+        <p14:creationId xmlns:p14="http://schemas.microsoft.com/office/powerpoint/2010/main" val="1433465262"/>
       </p:ext>
     </p:extLst>
   </p:cSld>
@@ -2888,7 +3338,28 @@
           <a:bodyPr/>
           <a:lstStyle/>
           <a:p>
+            <a:r>
+              <a:rPr lang="en-US" dirty="0"/>
+              <a:t>How about this line?  What happened?  (it took the square root of 49!)</a:t>
+            </a:r>
+          </a:p>
+          <a:p>
             <a:endParaRPr lang="en-US" dirty="0"/>
+          </a:p>
+          <a:p>
+            <a:r>
+              <a:rPr lang="en-US" dirty="0"/>
+              <a:t>Maybe more generally, R uses FUNCTIONS.</a:t>
+            </a:r>
+          </a:p>
+          <a:p>
+            <a:endParaRPr lang="en-US" dirty="0"/>
+          </a:p>
+          <a:p>
+            <a:r>
+              <a:rPr lang="en-US" dirty="0"/>
+              <a:t>Here’s a little bit of R terminology: the inputs (or … stuff that go inside the parentheses) are referred to as ARGUMENTS</a:t>
+            </a:r>
           </a:p>
         </p:txBody>
       </p:sp>
@@ -2983,7 +3454,7 @@
           <a:p>
             <a:r>
               <a:rPr lang="en-US" dirty="0"/>
-              <a:t>Perhaps more importantly: ERRORS HAPPEN!  And with every error, we get a message that might give us some insight as to what went wrong</a:t>
+              <a:t>But, maybe a MORE important insight:: ERRORS HAPPEN!  And with every error, we get a message that might give us some clues as to what went wrong</a:t>
             </a:r>
           </a:p>
           <a:p>
@@ -3079,7 +3550,7 @@
           <a:p>
             <a:r>
               <a:rPr lang="en-US" dirty="0"/>
-              <a:t>How about these two lines?</a:t>
+              <a:t>How about these two lines?  What happened?</a:t>
             </a:r>
           </a:p>
         </p:txBody>
@@ -3164,10 +3635,7 @@
           <a:bodyPr/>
           <a:lstStyle/>
           <a:p>
-            <a:r>
-              <a:rPr lang="en-US" dirty="0"/>
-              <a:t>How about these two lines?</a:t>
-            </a:r>
+            <a:endParaRPr lang="en-US" dirty="0"/>
           </a:p>
         </p:txBody>
       </p:sp>
@@ -3262,7 +3730,25 @@
           <a:p>
             <a:r>
               <a:rPr lang="en-US" dirty="0"/>
-              <a:t>… and R uses VECTORS for a lot of things, so it’s worth camping on the idea for a while and trying to internalize how vectors behave.</a:t>
+              <a:t>…and this is an important enough concept that it gets its own name.  If it’s helpful, you can think of a vector as being like a COLUMN of a spreadsheet.</a:t>
+            </a:r>
+          </a:p>
+          <a:p>
+            <a:endParaRPr lang="en-US" dirty="0"/>
+          </a:p>
+          <a:p>
+            <a:r>
+              <a:rPr lang="en-US" dirty="0"/>
+              <a:t>And by the way: you won’t have to type stuff by hand like this very often: Most of the time you’ll be reading data from an external file.</a:t>
+            </a:r>
+          </a:p>
+          <a:p>
+            <a:endParaRPr lang="en-US" dirty="0"/>
+          </a:p>
+          <a:p>
+            <a:r>
+              <a:rPr lang="en-US" dirty="0"/>
+              <a:t>BUT it’s worth looking at some simplified examples first, so you’ll have an intuition for how things will behave once it’s read INTO R.</a:t>
             </a:r>
           </a:p>
         </p:txBody>
@@ -3450,7 +3936,7 @@
           <a:p>
             <a:fld id="{00F5AAE2-11C8-4D46-A716-B78E4D7C1BCB}" type="datetimeFigureOut">
               <a:rPr lang="en-US" smtClean="0"/>
-              <a:t>11/6/2023</a:t>
+              <a:t>11/9/2023</a:t>
             </a:fld>
             <a:endParaRPr lang="en-US"/>
           </a:p>
@@ -3648,7 +4134,7 @@
           <a:p>
             <a:fld id="{00F5AAE2-11C8-4D46-A716-B78E4D7C1BCB}" type="datetimeFigureOut">
               <a:rPr lang="en-US" smtClean="0"/>
-              <a:t>11/6/2023</a:t>
+              <a:t>11/9/2023</a:t>
             </a:fld>
             <a:endParaRPr lang="en-US"/>
           </a:p>
@@ -3856,7 +4342,7 @@
           <a:p>
             <a:fld id="{00F5AAE2-11C8-4D46-A716-B78E4D7C1BCB}" type="datetimeFigureOut">
               <a:rPr lang="en-US" smtClean="0"/>
-              <a:t>11/6/2023</a:t>
+              <a:t>11/9/2023</a:t>
             </a:fld>
             <a:endParaRPr lang="en-US"/>
           </a:p>
@@ -4054,7 +4540,7 @@
           <a:p>
             <a:fld id="{00F5AAE2-11C8-4D46-A716-B78E4D7C1BCB}" type="datetimeFigureOut">
               <a:rPr lang="en-US" smtClean="0"/>
-              <a:t>11/6/2023</a:t>
+              <a:t>11/9/2023</a:t>
             </a:fld>
             <a:endParaRPr lang="en-US"/>
           </a:p>
@@ -4329,7 +4815,7 @@
           <a:p>
             <a:fld id="{00F5AAE2-11C8-4D46-A716-B78E4D7C1BCB}" type="datetimeFigureOut">
               <a:rPr lang="en-US" smtClean="0"/>
-              <a:t>11/6/2023</a:t>
+              <a:t>11/9/2023</a:t>
             </a:fld>
             <a:endParaRPr lang="en-US"/>
           </a:p>
@@ -4594,7 +5080,7 @@
           <a:p>
             <a:fld id="{00F5AAE2-11C8-4D46-A716-B78E4D7C1BCB}" type="datetimeFigureOut">
               <a:rPr lang="en-US" smtClean="0"/>
-              <a:t>11/6/2023</a:t>
+              <a:t>11/9/2023</a:t>
             </a:fld>
             <a:endParaRPr lang="en-US"/>
           </a:p>
@@ -5006,7 +5492,7 @@
           <a:p>
             <a:fld id="{00F5AAE2-11C8-4D46-A716-B78E4D7C1BCB}" type="datetimeFigureOut">
               <a:rPr lang="en-US" smtClean="0"/>
-              <a:t>11/6/2023</a:t>
+              <a:t>11/9/2023</a:t>
             </a:fld>
             <a:endParaRPr lang="en-US"/>
           </a:p>
@@ -5147,7 +5633,7 @@
           <a:p>
             <a:fld id="{00F5AAE2-11C8-4D46-A716-B78E4D7C1BCB}" type="datetimeFigureOut">
               <a:rPr lang="en-US" smtClean="0"/>
-              <a:t>11/6/2023</a:t>
+              <a:t>11/9/2023</a:t>
             </a:fld>
             <a:endParaRPr lang="en-US"/>
           </a:p>
@@ -5260,7 +5746,7 @@
           <a:p>
             <a:fld id="{00F5AAE2-11C8-4D46-A716-B78E4D7C1BCB}" type="datetimeFigureOut">
               <a:rPr lang="en-US" smtClean="0"/>
-              <a:t>11/6/2023</a:t>
+              <a:t>11/9/2023</a:t>
             </a:fld>
             <a:endParaRPr lang="en-US"/>
           </a:p>
@@ -5571,7 +6057,7 @@
           <a:p>
             <a:fld id="{00F5AAE2-11C8-4D46-A716-B78E4D7C1BCB}" type="datetimeFigureOut">
               <a:rPr lang="en-US" smtClean="0"/>
-              <a:t>11/6/2023</a:t>
+              <a:t>11/9/2023</a:t>
             </a:fld>
             <a:endParaRPr lang="en-US"/>
           </a:p>
@@ -5859,7 +6345,7 @@
           <a:p>
             <a:fld id="{00F5AAE2-11C8-4D46-A716-B78E4D7C1BCB}" type="datetimeFigureOut">
               <a:rPr lang="en-US" smtClean="0"/>
-              <a:t>11/6/2023</a:t>
+              <a:t>11/9/2023</a:t>
             </a:fld>
             <a:endParaRPr lang="en-US"/>
           </a:p>
@@ -6100,7 +6586,7 @@
           <a:p>
             <a:fld id="{00F5AAE2-11C8-4D46-A716-B78E4D7C1BCB}" type="datetimeFigureOut">
               <a:rPr lang="en-US" smtClean="0"/>
-              <a:t>11/6/2023</a:t>
+              <a:t>11/9/2023</a:t>
             </a:fld>
             <a:endParaRPr lang="en-US"/>
           </a:p>
@@ -7774,7 +8260,7 @@
           <p:nvPr/>
         </p:nvPicPr>
         <p:blipFill>
-          <a:blip r:embed="rId2"/>
+          <a:blip r:embed="rId3"/>
           <a:stretch>
             <a:fillRect/>
           </a:stretch>
@@ -13216,7 +13702,7 @@
             </a:pPr>
             <a:r>
               <a:rPr lang="en-US" dirty="0"/>
-              <a:t>That weird [1] thing we keep seeing? It’s just R labeling the index of the first element of each row of output!</a:t>
+              <a:t>That weird [1] thing we keep seeing? It’s just R labeling where each line of output starts!</a:t>
             </a:r>
           </a:p>
         </p:txBody>
@@ -25784,7 +26270,7 @@
           <p:nvPr/>
         </p:nvPicPr>
         <p:blipFill>
-          <a:blip r:embed="rId2"/>
+          <a:blip r:embed="rId3"/>
           <a:stretch>
             <a:fillRect/>
           </a:stretch>
@@ -27087,7 +27573,7 @@
         </p:spPr>
         <p:txBody>
           <a:bodyPr>
-            <a:normAutofit/>
+            <a:normAutofit fontScale="92500" lnSpcReduction="10000"/>
           </a:bodyPr>
           <a:lstStyle/>
           <a:p>
@@ -27184,14 +27670,6 @@
             <a:pPr marL="0" indent="0">
               <a:buNone/>
             </a:pPr>
-            <a:r>
-              <a:rPr lang="en-US" dirty="0" err="1">
-                <a:solidFill>
-                  <a:schemeClr val="accent1"/>
-                </a:solidFill>
-              </a:rPr>
-              <a:t>tech_char</a:t>
-            </a:r>
             <a:endParaRPr lang="en-US" dirty="0">
               <a:solidFill>
                 <a:schemeClr val="accent1"/>
@@ -27203,21 +27681,12 @@
               <a:buNone/>
             </a:pPr>
             <a:r>
-              <a:rPr lang="en-US" dirty="0"/>
-              <a:t>[1] Chuck  Albert Betty  Albert Betty </a:t>
-            </a:r>
-          </a:p>
-          <a:p>
-            <a:pPr marL="0" indent="0">
-              <a:buNone/>
-            </a:pPr>
-            <a:r>
               <a:rPr lang="en-US" dirty="0" err="1">
                 <a:solidFill>
                   <a:schemeClr val="accent1"/>
                 </a:solidFill>
               </a:rPr>
-              <a:t>tech_factor</a:t>
+              <a:t>tech_char</a:t>
             </a:r>
             <a:endParaRPr lang="en-US" dirty="0">
               <a:solidFill>
@@ -27239,9 +27708,46 @@
               <a:buNone/>
             </a:pPr>
             <a:r>
+              <a:rPr lang="en-US" dirty="0" err="1">
+                <a:solidFill>
+                  <a:schemeClr val="accent1"/>
+                </a:solidFill>
+              </a:rPr>
+              <a:t>tech_factor</a:t>
+            </a:r>
+            <a:endParaRPr lang="en-US" dirty="0">
+              <a:solidFill>
+                <a:schemeClr val="accent1"/>
+              </a:solidFill>
+            </a:endParaRPr>
+          </a:p>
+          <a:p>
+            <a:pPr marL="0" indent="0">
+              <a:buNone/>
+            </a:pPr>
+            <a:r>
+              <a:rPr lang="en-US" dirty="0"/>
+              <a:t>[1] Chuck  Albert Betty  Albert Betty </a:t>
+            </a:r>
+          </a:p>
+          <a:p>
+            <a:pPr marL="0" indent="0">
+              <a:buNone/>
+            </a:pPr>
+            <a:r>
               <a:rPr lang="en-US" dirty="0"/>
               <a:t>Levels: Albert Betty Chuck</a:t>
             </a:r>
+            <a:endParaRPr lang="en-US" dirty="0">
+              <a:solidFill>
+                <a:schemeClr val="accent1"/>
+              </a:solidFill>
+            </a:endParaRPr>
+          </a:p>
+          <a:p>
+            <a:pPr marL="0" indent="0">
+              <a:buNone/>
+            </a:pPr>
             <a:endParaRPr lang="en-US" dirty="0">
               <a:solidFill>
                 <a:schemeClr val="accent1"/>
@@ -27830,7 +28336,7 @@
                                         <p:tgtEl>
                                           <p:spTgt spid="6">
                                             <p:txEl>
-                                              <p:pRg st="2" end="2"/>
+                                              <p:pRg st="3" end="3"/>
                                             </p:txEl>
                                           </p:spTgt>
                                         </p:tgtEl>
@@ -27861,7 +28367,7 @@
                                         <p:tgtEl>
                                           <p:spTgt spid="6">
                                             <p:txEl>
-                                              <p:pRg st="3" end="3"/>
+                                              <p:pRg st="4" end="4"/>
                                             </p:txEl>
                                           </p:spTgt>
                                         </p:tgtEl>
@@ -27910,7 +28416,7 @@
                                         <p:tgtEl>
                                           <p:spTgt spid="6">
                                             <p:txEl>
-                                              <p:pRg st="4" end="4"/>
+                                              <p:pRg st="5" end="5"/>
                                             </p:txEl>
                                           </p:spTgt>
                                         </p:tgtEl>
@@ -27941,7 +28447,7 @@
                                         <p:tgtEl>
                                           <p:spTgt spid="6">
                                             <p:txEl>
-                                              <p:pRg st="5" end="5"/>
+                                              <p:pRg st="6" end="6"/>
                                             </p:txEl>
                                           </p:spTgt>
                                         </p:tgtEl>
@@ -27972,7 +28478,7 @@
                                         <p:tgtEl>
                                           <p:spTgt spid="6">
                                             <p:txEl>
-                                              <p:pRg st="6" end="6"/>
+                                              <p:pRg st="7" end="7"/>
                                             </p:txEl>
                                           </p:spTgt>
                                         </p:tgtEl>
@@ -28066,7 +28572,7 @@
                                         <p:tgtEl>
                                           <p:spTgt spid="6">
                                             <p:txEl>
-                                              <p:pRg st="7" end="7"/>
+                                              <p:pRg st="9" end="9"/>
                                             </p:txEl>
                                           </p:spTgt>
                                         </p:tgtEl>
@@ -28097,7 +28603,7 @@
                                         <p:tgtEl>
                                           <p:spTgt spid="6">
                                             <p:txEl>
-                                              <p:pRg st="8" end="8"/>
+                                              <p:pRg st="10" end="10"/>
                                             </p:txEl>
                                           </p:spTgt>
                                         </p:tgtEl>
@@ -32995,6 +33501,145 @@
           </a:p>
         </p:txBody>
       </p:sp>
+      <p:pic>
+        <p:nvPicPr>
+          <p:cNvPr id="4" name="Picture 3">
+            <a:extLst>
+              <a:ext uri="{FF2B5EF4-FFF2-40B4-BE49-F238E27FC236}">
+                <a16:creationId xmlns:a16="http://schemas.microsoft.com/office/drawing/2014/main" id="{56B964F4-A5BA-7AD1-901A-BDE2F2258B14}"/>
+              </a:ext>
+            </a:extLst>
+          </p:cNvPr>
+          <p:cNvPicPr>
+            <a:picLocks noChangeAspect="1"/>
+          </p:cNvPicPr>
+          <p:nvPr/>
+        </p:nvPicPr>
+        <p:blipFill rotWithShape="1">
+          <a:blip r:embed="rId3" cstate="print">
+            <a:extLst>
+              <a:ext uri="{28A0092B-C50C-407E-A947-70E740481C1C}">
+                <a14:useLocalDpi xmlns:a14="http://schemas.microsoft.com/office/drawing/2010/main"/>
+              </a:ext>
+            </a:extLst>
+          </a:blip>
+          <a:srcRect/>
+          <a:stretch/>
+        </p:blipFill>
+        <p:spPr>
+          <a:xfrm>
+            <a:off x="11091408" y="0"/>
+            <a:ext cx="1100592" cy="2636463"/>
+          </a:xfrm>
+          <a:prstGeom prst="rect">
+            <a:avLst/>
+          </a:prstGeom>
+        </p:spPr>
+      </p:pic>
+      <p:sp>
+        <p:nvSpPr>
+          <p:cNvPr id="5" name="Rectangle 4">
+            <a:extLst>
+              <a:ext uri="{FF2B5EF4-FFF2-40B4-BE49-F238E27FC236}">
+                <a16:creationId xmlns:a16="http://schemas.microsoft.com/office/drawing/2014/main" id="{A19C2B9C-4F34-1973-AC67-ABEEF0F17293}"/>
+              </a:ext>
+            </a:extLst>
+          </p:cNvPr>
+          <p:cNvSpPr/>
+          <p:nvPr/>
+        </p:nvSpPr>
+        <p:spPr>
+          <a:xfrm>
+            <a:off x="10993426" y="378135"/>
+            <a:ext cx="211319" cy="155547"/>
+          </a:xfrm>
+          <a:prstGeom prst="rect">
+            <a:avLst/>
+          </a:prstGeom>
+          <a:solidFill>
+            <a:schemeClr val="bg1"/>
+          </a:solidFill>
+          <a:ln>
+            <a:noFill/>
+          </a:ln>
+        </p:spPr>
+        <p:style>
+          <a:lnRef idx="2">
+            <a:schemeClr val="accent1">
+              <a:shade val="15000"/>
+            </a:schemeClr>
+          </a:lnRef>
+          <a:fillRef idx="1">
+            <a:schemeClr val="accent1"/>
+          </a:fillRef>
+          <a:effectRef idx="0">
+            <a:schemeClr val="accent1"/>
+          </a:effectRef>
+          <a:fontRef idx="minor">
+            <a:schemeClr val="lt1"/>
+          </a:fontRef>
+        </p:style>
+        <p:txBody>
+          <a:bodyPr rtlCol="0" anchor="ctr"/>
+          <a:lstStyle/>
+          <a:p>
+            <a:pPr algn="ctr"/>
+            <a:endParaRPr lang="en-US"/>
+          </a:p>
+        </p:txBody>
+      </p:sp>
+      <p:sp>
+        <p:nvSpPr>
+          <p:cNvPr id="6" name="Rectangle 5">
+            <a:extLst>
+              <a:ext uri="{FF2B5EF4-FFF2-40B4-BE49-F238E27FC236}">
+                <a16:creationId xmlns:a16="http://schemas.microsoft.com/office/drawing/2014/main" id="{94129B6C-18F0-9610-3C48-481090BBAB66}"/>
+              </a:ext>
+            </a:extLst>
+          </p:cNvPr>
+          <p:cNvSpPr/>
+          <p:nvPr/>
+        </p:nvSpPr>
+        <p:spPr>
+          <a:xfrm>
+            <a:off x="12074253" y="-1"/>
+            <a:ext cx="117747" cy="142737"/>
+          </a:xfrm>
+          <a:prstGeom prst="rect">
+            <a:avLst/>
+          </a:prstGeom>
+          <a:solidFill>
+            <a:schemeClr val="bg1"/>
+          </a:solidFill>
+          <a:ln>
+            <a:noFill/>
+          </a:ln>
+        </p:spPr>
+        <p:style>
+          <a:lnRef idx="2">
+            <a:schemeClr val="accent1">
+              <a:shade val="15000"/>
+            </a:schemeClr>
+          </a:lnRef>
+          <a:fillRef idx="1">
+            <a:schemeClr val="accent1"/>
+          </a:fillRef>
+          <a:effectRef idx="0">
+            <a:schemeClr val="accent1"/>
+          </a:effectRef>
+          <a:fontRef idx="minor">
+            <a:schemeClr val="lt1"/>
+          </a:fontRef>
+        </p:style>
+        <p:txBody>
+          <a:bodyPr rtlCol="0" anchor="ctr"/>
+          <a:lstStyle/>
+          <a:p>
+            <a:pPr algn="ctr"/>
+            <a:endParaRPr lang="en-US"/>
+          </a:p>
+        </p:txBody>
+      </p:sp>
     </p:spTree>
     <p:extLst>
       <p:ext uri="{BB962C8B-B14F-4D97-AF65-F5344CB8AC3E}">
@@ -33563,6 +34208,145 @@
               <a:rPr lang="en-US" dirty="0"/>
               <a:t>(inputs)</a:t>
             </a:r>
+          </a:p>
+        </p:txBody>
+      </p:sp>
+      <p:pic>
+        <p:nvPicPr>
+          <p:cNvPr id="4" name="Picture 3">
+            <a:extLst>
+              <a:ext uri="{FF2B5EF4-FFF2-40B4-BE49-F238E27FC236}">
+                <a16:creationId xmlns:a16="http://schemas.microsoft.com/office/drawing/2014/main" id="{E8849A61-A77E-00C9-65BE-EEF19CB4333D}"/>
+              </a:ext>
+            </a:extLst>
+          </p:cNvPr>
+          <p:cNvPicPr>
+            <a:picLocks noChangeAspect="1"/>
+          </p:cNvPicPr>
+          <p:nvPr/>
+        </p:nvPicPr>
+        <p:blipFill rotWithShape="1">
+          <a:blip r:embed="rId2" cstate="print">
+            <a:extLst>
+              <a:ext uri="{28A0092B-C50C-407E-A947-70E740481C1C}">
+                <a14:useLocalDpi xmlns:a14="http://schemas.microsoft.com/office/drawing/2010/main"/>
+              </a:ext>
+            </a:extLst>
+          </a:blip>
+          <a:srcRect/>
+          <a:stretch/>
+        </p:blipFill>
+        <p:spPr>
+          <a:xfrm>
+            <a:off x="11091408" y="0"/>
+            <a:ext cx="1100592" cy="2636463"/>
+          </a:xfrm>
+          <a:prstGeom prst="rect">
+            <a:avLst/>
+          </a:prstGeom>
+        </p:spPr>
+      </p:pic>
+      <p:sp>
+        <p:nvSpPr>
+          <p:cNvPr id="5" name="Rectangle 4">
+            <a:extLst>
+              <a:ext uri="{FF2B5EF4-FFF2-40B4-BE49-F238E27FC236}">
+                <a16:creationId xmlns:a16="http://schemas.microsoft.com/office/drawing/2014/main" id="{139B9345-8D91-3DF1-F810-02CD03922044}"/>
+              </a:ext>
+            </a:extLst>
+          </p:cNvPr>
+          <p:cNvSpPr/>
+          <p:nvPr/>
+        </p:nvSpPr>
+        <p:spPr>
+          <a:xfrm>
+            <a:off x="10993426" y="378135"/>
+            <a:ext cx="211319" cy="155547"/>
+          </a:xfrm>
+          <a:prstGeom prst="rect">
+            <a:avLst/>
+          </a:prstGeom>
+          <a:solidFill>
+            <a:schemeClr val="bg1"/>
+          </a:solidFill>
+          <a:ln>
+            <a:noFill/>
+          </a:ln>
+        </p:spPr>
+        <p:style>
+          <a:lnRef idx="2">
+            <a:schemeClr val="accent1">
+              <a:shade val="15000"/>
+            </a:schemeClr>
+          </a:lnRef>
+          <a:fillRef idx="1">
+            <a:schemeClr val="accent1"/>
+          </a:fillRef>
+          <a:effectRef idx="0">
+            <a:schemeClr val="accent1"/>
+          </a:effectRef>
+          <a:fontRef idx="minor">
+            <a:schemeClr val="lt1"/>
+          </a:fontRef>
+        </p:style>
+        <p:txBody>
+          <a:bodyPr rtlCol="0" anchor="ctr"/>
+          <a:lstStyle/>
+          <a:p>
+            <a:pPr algn="ctr"/>
+            <a:endParaRPr lang="en-US"/>
+          </a:p>
+        </p:txBody>
+      </p:sp>
+      <p:sp>
+        <p:nvSpPr>
+          <p:cNvPr id="7" name="Rectangle 6">
+            <a:extLst>
+              <a:ext uri="{FF2B5EF4-FFF2-40B4-BE49-F238E27FC236}">
+                <a16:creationId xmlns:a16="http://schemas.microsoft.com/office/drawing/2014/main" id="{13ACF747-EB75-65C3-B666-25337EAA4988}"/>
+              </a:ext>
+            </a:extLst>
+          </p:cNvPr>
+          <p:cNvSpPr/>
+          <p:nvPr/>
+        </p:nvSpPr>
+        <p:spPr>
+          <a:xfrm>
+            <a:off x="12074253" y="-1"/>
+            <a:ext cx="117747" cy="142737"/>
+          </a:xfrm>
+          <a:prstGeom prst="rect">
+            <a:avLst/>
+          </a:prstGeom>
+          <a:solidFill>
+            <a:schemeClr val="bg1"/>
+          </a:solidFill>
+          <a:ln>
+            <a:noFill/>
+          </a:ln>
+        </p:spPr>
+        <p:style>
+          <a:lnRef idx="2">
+            <a:schemeClr val="accent1">
+              <a:shade val="15000"/>
+            </a:schemeClr>
+          </a:lnRef>
+          <a:fillRef idx="1">
+            <a:schemeClr val="accent1"/>
+          </a:fillRef>
+          <a:effectRef idx="0">
+            <a:schemeClr val="accent1"/>
+          </a:effectRef>
+          <a:fontRef idx="minor">
+            <a:schemeClr val="lt1"/>
+          </a:fontRef>
+        </p:style>
+        <p:txBody>
+          <a:bodyPr rtlCol="0" anchor="ctr"/>
+          <a:lstStyle/>
+          <a:p>
+            <a:pPr algn="ctr"/>
+            <a:endParaRPr lang="en-US"/>
           </a:p>
         </p:txBody>
       </p:sp>
@@ -34154,6 +34938,145 @@
               <a:rPr lang="en-US" dirty="0"/>
               <a:t>Note: these go away when you close R, but that’s a good thing</a:t>
             </a:r>
+          </a:p>
+        </p:txBody>
+      </p:sp>
+      <p:pic>
+        <p:nvPicPr>
+          <p:cNvPr id="4" name="Picture 3">
+            <a:extLst>
+              <a:ext uri="{FF2B5EF4-FFF2-40B4-BE49-F238E27FC236}">
+                <a16:creationId xmlns:a16="http://schemas.microsoft.com/office/drawing/2014/main" id="{66DC6711-8A4C-BAC3-7512-FE04EBF6562B}"/>
+              </a:ext>
+            </a:extLst>
+          </p:cNvPr>
+          <p:cNvPicPr>
+            <a:picLocks noChangeAspect="1"/>
+          </p:cNvPicPr>
+          <p:nvPr/>
+        </p:nvPicPr>
+        <p:blipFill rotWithShape="1">
+          <a:blip r:embed="rId2" cstate="print">
+            <a:extLst>
+              <a:ext uri="{28A0092B-C50C-407E-A947-70E740481C1C}">
+                <a14:useLocalDpi xmlns:a14="http://schemas.microsoft.com/office/drawing/2010/main"/>
+              </a:ext>
+            </a:extLst>
+          </a:blip>
+          <a:srcRect/>
+          <a:stretch/>
+        </p:blipFill>
+        <p:spPr>
+          <a:xfrm>
+            <a:off x="11091408" y="0"/>
+            <a:ext cx="1100592" cy="2636463"/>
+          </a:xfrm>
+          <a:prstGeom prst="rect">
+            <a:avLst/>
+          </a:prstGeom>
+        </p:spPr>
+      </p:pic>
+      <p:sp>
+        <p:nvSpPr>
+          <p:cNvPr id="5" name="Rectangle 4">
+            <a:extLst>
+              <a:ext uri="{FF2B5EF4-FFF2-40B4-BE49-F238E27FC236}">
+                <a16:creationId xmlns:a16="http://schemas.microsoft.com/office/drawing/2014/main" id="{D44E9EB6-ABCD-7B00-E30A-DCFB6110AD1F}"/>
+              </a:ext>
+            </a:extLst>
+          </p:cNvPr>
+          <p:cNvSpPr/>
+          <p:nvPr/>
+        </p:nvSpPr>
+        <p:spPr>
+          <a:xfrm>
+            <a:off x="10993426" y="378135"/>
+            <a:ext cx="211319" cy="155547"/>
+          </a:xfrm>
+          <a:prstGeom prst="rect">
+            <a:avLst/>
+          </a:prstGeom>
+          <a:solidFill>
+            <a:schemeClr val="bg1"/>
+          </a:solidFill>
+          <a:ln>
+            <a:noFill/>
+          </a:ln>
+        </p:spPr>
+        <p:style>
+          <a:lnRef idx="2">
+            <a:schemeClr val="accent1">
+              <a:shade val="15000"/>
+            </a:schemeClr>
+          </a:lnRef>
+          <a:fillRef idx="1">
+            <a:schemeClr val="accent1"/>
+          </a:fillRef>
+          <a:effectRef idx="0">
+            <a:schemeClr val="accent1"/>
+          </a:effectRef>
+          <a:fontRef idx="minor">
+            <a:schemeClr val="lt1"/>
+          </a:fontRef>
+        </p:style>
+        <p:txBody>
+          <a:bodyPr rtlCol="0" anchor="ctr"/>
+          <a:lstStyle/>
+          <a:p>
+            <a:pPr algn="ctr"/>
+            <a:endParaRPr lang="en-US"/>
+          </a:p>
+        </p:txBody>
+      </p:sp>
+      <p:sp>
+        <p:nvSpPr>
+          <p:cNvPr id="7" name="Rectangle 6">
+            <a:extLst>
+              <a:ext uri="{FF2B5EF4-FFF2-40B4-BE49-F238E27FC236}">
+                <a16:creationId xmlns:a16="http://schemas.microsoft.com/office/drawing/2014/main" id="{FEA63606-BE96-2553-1C11-D35562A18A2D}"/>
+              </a:ext>
+            </a:extLst>
+          </p:cNvPr>
+          <p:cNvSpPr/>
+          <p:nvPr/>
+        </p:nvSpPr>
+        <p:spPr>
+          <a:xfrm>
+            <a:off x="12074253" y="-1"/>
+            <a:ext cx="117747" cy="142737"/>
+          </a:xfrm>
+          <a:prstGeom prst="rect">
+            <a:avLst/>
+          </a:prstGeom>
+          <a:solidFill>
+            <a:schemeClr val="bg1"/>
+          </a:solidFill>
+          <a:ln>
+            <a:noFill/>
+          </a:ln>
+        </p:spPr>
+        <p:style>
+          <a:lnRef idx="2">
+            <a:schemeClr val="accent1">
+              <a:shade val="15000"/>
+            </a:schemeClr>
+          </a:lnRef>
+          <a:fillRef idx="1">
+            <a:schemeClr val="accent1"/>
+          </a:fillRef>
+          <a:effectRef idx="0">
+            <a:schemeClr val="accent1"/>
+          </a:effectRef>
+          <a:fontRef idx="minor">
+            <a:schemeClr val="lt1"/>
+          </a:fontRef>
+        </p:style>
+        <p:txBody>
+          <a:bodyPr rtlCol="0" anchor="ctr"/>
+          <a:lstStyle/>
+          <a:p>
+            <a:pPr algn="ctr"/>
+            <a:endParaRPr lang="en-US"/>
           </a:p>
         </p:txBody>
       </p:sp>
@@ -44058,6 +44981,51 @@
                                     <p:set>
                                       <p:cBhvr>
                                         <p:cTn id="6" dur="1" fill="hold">
+                                          <p:stCondLst>
+                                            <p:cond delay="0"/>
+                                          </p:stCondLst>
+                                        </p:cTn>
+                                        <p:tgtEl>
+                                          <p:spTgt spid="5"/>
+                                        </p:tgtEl>
+                                        <p:attrNameLst>
+                                          <p:attrName>style.visibility</p:attrName>
+                                        </p:attrNameLst>
+                                      </p:cBhvr>
+                                      <p:to>
+                                        <p:strVal val="visible"/>
+                                      </p:to>
+                                    </p:set>
+                                  </p:childTnLst>
+                                </p:cTn>
+                              </p:par>
+                            </p:childTnLst>
+                          </p:cTn>
+                        </p:par>
+                      </p:childTnLst>
+                    </p:cTn>
+                  </p:par>
+                  <p:par>
+                    <p:cTn id="7" fill="hold">
+                      <p:stCondLst>
+                        <p:cond delay="indefinite"/>
+                      </p:stCondLst>
+                      <p:childTnLst>
+                        <p:par>
+                          <p:cTn id="8" fill="hold">
+                            <p:stCondLst>
+                              <p:cond delay="0"/>
+                            </p:stCondLst>
+                            <p:childTnLst>
+                              <p:par>
+                                <p:cTn id="9" presetID="1" presetClass="entr" presetSubtype="0" fill="hold" nodeType="clickEffect">
+                                  <p:stCondLst>
+                                    <p:cond delay="0"/>
+                                  </p:stCondLst>
+                                  <p:childTnLst>
+                                    <p:set>
+                                      <p:cBhvr>
+                                        <p:cTn id="10" dur="1" fill="hold">
                                           <p:stCondLst>
                                             <p:cond delay="0"/>
                                           </p:stCondLst>

</xml_diff>

<commit_message>
many minor edits to MT sections
</commit_message>
<xml_diff>
--- a/presentations/3 - Programming Basics 1 - Poke the Box.pptx
+++ b/presentations/3 - Programming Basics 1 - Poke the Box.pptx
@@ -240,7 +240,7 @@
           <a:p>
             <a:fld id="{0C3747FC-B9FC-4317-A7AC-005EC1BA3397}" type="datetimeFigureOut">
               <a:rPr lang="en-US" smtClean="0"/>
-              <a:t>12/4/2023</a:t>
+              <a:t>12/6/2023</a:t>
             </a:fld>
             <a:endParaRPr lang="en-US"/>
           </a:p>
@@ -4208,7 +4208,7 @@
           <a:p>
             <a:fld id="{00F5AAE2-11C8-4D46-A716-B78E4D7C1BCB}" type="datetimeFigureOut">
               <a:rPr lang="en-US" smtClean="0"/>
-              <a:t>12/4/2023</a:t>
+              <a:t>12/6/2023</a:t>
             </a:fld>
             <a:endParaRPr lang="en-US"/>
           </a:p>
@@ -4406,7 +4406,7 @@
           <a:p>
             <a:fld id="{00F5AAE2-11C8-4D46-A716-B78E4D7C1BCB}" type="datetimeFigureOut">
               <a:rPr lang="en-US" smtClean="0"/>
-              <a:t>12/4/2023</a:t>
+              <a:t>12/6/2023</a:t>
             </a:fld>
             <a:endParaRPr lang="en-US"/>
           </a:p>
@@ -4614,7 +4614,7 @@
           <a:p>
             <a:fld id="{00F5AAE2-11C8-4D46-A716-B78E4D7C1BCB}" type="datetimeFigureOut">
               <a:rPr lang="en-US" smtClean="0"/>
-              <a:t>12/4/2023</a:t>
+              <a:t>12/6/2023</a:t>
             </a:fld>
             <a:endParaRPr lang="en-US"/>
           </a:p>
@@ -4812,7 +4812,7 @@
           <a:p>
             <a:fld id="{00F5AAE2-11C8-4D46-A716-B78E4D7C1BCB}" type="datetimeFigureOut">
               <a:rPr lang="en-US" smtClean="0"/>
-              <a:t>12/4/2023</a:t>
+              <a:t>12/6/2023</a:t>
             </a:fld>
             <a:endParaRPr lang="en-US"/>
           </a:p>
@@ -5087,7 +5087,7 @@
           <a:p>
             <a:fld id="{00F5AAE2-11C8-4D46-A716-B78E4D7C1BCB}" type="datetimeFigureOut">
               <a:rPr lang="en-US" smtClean="0"/>
-              <a:t>12/4/2023</a:t>
+              <a:t>12/6/2023</a:t>
             </a:fld>
             <a:endParaRPr lang="en-US"/>
           </a:p>
@@ -5352,7 +5352,7 @@
           <a:p>
             <a:fld id="{00F5AAE2-11C8-4D46-A716-B78E4D7C1BCB}" type="datetimeFigureOut">
               <a:rPr lang="en-US" smtClean="0"/>
-              <a:t>12/4/2023</a:t>
+              <a:t>12/6/2023</a:t>
             </a:fld>
             <a:endParaRPr lang="en-US"/>
           </a:p>
@@ -5764,7 +5764,7 @@
           <a:p>
             <a:fld id="{00F5AAE2-11C8-4D46-A716-B78E4D7C1BCB}" type="datetimeFigureOut">
               <a:rPr lang="en-US" smtClean="0"/>
-              <a:t>12/4/2023</a:t>
+              <a:t>12/6/2023</a:t>
             </a:fld>
             <a:endParaRPr lang="en-US"/>
           </a:p>
@@ -5905,7 +5905,7 @@
           <a:p>
             <a:fld id="{00F5AAE2-11C8-4D46-A716-B78E4D7C1BCB}" type="datetimeFigureOut">
               <a:rPr lang="en-US" smtClean="0"/>
-              <a:t>12/4/2023</a:t>
+              <a:t>12/6/2023</a:t>
             </a:fld>
             <a:endParaRPr lang="en-US"/>
           </a:p>
@@ -6018,7 +6018,7 @@
           <a:p>
             <a:fld id="{00F5AAE2-11C8-4D46-A716-B78E4D7C1BCB}" type="datetimeFigureOut">
               <a:rPr lang="en-US" smtClean="0"/>
-              <a:t>12/4/2023</a:t>
+              <a:t>12/6/2023</a:t>
             </a:fld>
             <a:endParaRPr lang="en-US"/>
           </a:p>
@@ -6329,7 +6329,7 @@
           <a:p>
             <a:fld id="{00F5AAE2-11C8-4D46-A716-B78E4D7C1BCB}" type="datetimeFigureOut">
               <a:rPr lang="en-US" smtClean="0"/>
-              <a:t>12/4/2023</a:t>
+              <a:t>12/6/2023</a:t>
             </a:fld>
             <a:endParaRPr lang="en-US"/>
           </a:p>
@@ -6617,7 +6617,7 @@
           <a:p>
             <a:fld id="{00F5AAE2-11C8-4D46-A716-B78E4D7C1BCB}" type="datetimeFigureOut">
               <a:rPr lang="en-US" smtClean="0"/>
-              <a:t>12/4/2023</a:t>
+              <a:t>12/6/2023</a:t>
             </a:fld>
             <a:endParaRPr lang="en-US"/>
           </a:p>
@@ -6858,7 +6858,7 @@
           <a:p>
             <a:fld id="{00F5AAE2-11C8-4D46-A716-B78E4D7C1BCB}" type="datetimeFigureOut">
               <a:rPr lang="en-US" smtClean="0"/>
-              <a:t>12/4/2023</a:t>
+              <a:t>12/6/2023</a:t>
             </a:fld>
             <a:endParaRPr lang="en-US"/>
           </a:p>
@@ -18873,7 +18873,7 @@
           <a:p>
             <a:r>
               <a:rPr lang="en-US" dirty="0"/>
-              <a:t>An NA is a known “unknown”</a:t>
+              <a:t>An NA is a placeholder for an unknown value</a:t>
             </a:r>
           </a:p>
           <a:p>
@@ -39309,15 +39309,7 @@
           <a:p>
             <a:r>
               <a:rPr lang="en-US" sz="3600" b="1" dirty="0"/>
-              <a:t>One last thing before we head to </a:t>
-            </a:r>
-            <a:r>
-              <a:rPr lang="en-US" sz="3600" b="1" dirty="0" err="1"/>
-              <a:t>Rstudio</a:t>
-            </a:r>
-            <a:r>
-              <a:rPr lang="en-US" sz="3600" b="1" dirty="0"/>
-              <a:t>!</a:t>
+              <a:t>One last thing!</a:t>
             </a:r>
           </a:p>
         </p:txBody>
@@ -40823,15 +40815,7 @@
           <a:p>
             <a:r>
               <a:rPr lang="en-US" sz="3600" b="1" dirty="0"/>
-              <a:t>One last thing before we head to </a:t>
-            </a:r>
-            <a:r>
-              <a:rPr lang="en-US" sz="3600" b="1" dirty="0" err="1"/>
-              <a:t>Rstudio</a:t>
-            </a:r>
-            <a:r>
-              <a:rPr lang="en-US" sz="3600" b="1" dirty="0"/>
-              <a:t>!</a:t>
+              <a:t>One last thing!</a:t>
             </a:r>
           </a:p>
         </p:txBody>

</xml_diff>

<commit_message>
added a start of section 5 to the cheatsheet
and a few more minor edits to MT materials
</commit_message>
<xml_diff>
--- a/presentations/3 - Programming Basics 1 - Poke the Box.pptx
+++ b/presentations/3 - Programming Basics 1 - Poke the Box.pptx
@@ -240,7 +240,7 @@
           <a:p>
             <a:fld id="{0C3747FC-B9FC-4317-A7AC-005EC1BA3397}" type="datetimeFigureOut">
               <a:rPr lang="en-US" smtClean="0"/>
-              <a:t>12/6/2023</a:t>
+              <a:t>12/7/2023</a:t>
             </a:fld>
             <a:endParaRPr lang="en-US"/>
           </a:p>
@@ -4208,7 +4208,7 @@
           <a:p>
             <a:fld id="{00F5AAE2-11C8-4D46-A716-B78E4D7C1BCB}" type="datetimeFigureOut">
               <a:rPr lang="en-US" smtClean="0"/>
-              <a:t>12/6/2023</a:t>
+              <a:t>12/7/2023</a:t>
             </a:fld>
             <a:endParaRPr lang="en-US"/>
           </a:p>
@@ -4406,7 +4406,7 @@
           <a:p>
             <a:fld id="{00F5AAE2-11C8-4D46-A716-B78E4D7C1BCB}" type="datetimeFigureOut">
               <a:rPr lang="en-US" smtClean="0"/>
-              <a:t>12/6/2023</a:t>
+              <a:t>12/7/2023</a:t>
             </a:fld>
             <a:endParaRPr lang="en-US"/>
           </a:p>
@@ -4614,7 +4614,7 @@
           <a:p>
             <a:fld id="{00F5AAE2-11C8-4D46-A716-B78E4D7C1BCB}" type="datetimeFigureOut">
               <a:rPr lang="en-US" smtClean="0"/>
-              <a:t>12/6/2023</a:t>
+              <a:t>12/7/2023</a:t>
             </a:fld>
             <a:endParaRPr lang="en-US"/>
           </a:p>
@@ -4812,7 +4812,7 @@
           <a:p>
             <a:fld id="{00F5AAE2-11C8-4D46-A716-B78E4D7C1BCB}" type="datetimeFigureOut">
               <a:rPr lang="en-US" smtClean="0"/>
-              <a:t>12/6/2023</a:t>
+              <a:t>12/7/2023</a:t>
             </a:fld>
             <a:endParaRPr lang="en-US"/>
           </a:p>
@@ -5087,7 +5087,7 @@
           <a:p>
             <a:fld id="{00F5AAE2-11C8-4D46-A716-B78E4D7C1BCB}" type="datetimeFigureOut">
               <a:rPr lang="en-US" smtClean="0"/>
-              <a:t>12/6/2023</a:t>
+              <a:t>12/7/2023</a:t>
             </a:fld>
             <a:endParaRPr lang="en-US"/>
           </a:p>
@@ -5352,7 +5352,7 @@
           <a:p>
             <a:fld id="{00F5AAE2-11C8-4D46-A716-B78E4D7C1BCB}" type="datetimeFigureOut">
               <a:rPr lang="en-US" smtClean="0"/>
-              <a:t>12/6/2023</a:t>
+              <a:t>12/7/2023</a:t>
             </a:fld>
             <a:endParaRPr lang="en-US"/>
           </a:p>
@@ -5764,7 +5764,7 @@
           <a:p>
             <a:fld id="{00F5AAE2-11C8-4D46-A716-B78E4D7C1BCB}" type="datetimeFigureOut">
               <a:rPr lang="en-US" smtClean="0"/>
-              <a:t>12/6/2023</a:t>
+              <a:t>12/7/2023</a:t>
             </a:fld>
             <a:endParaRPr lang="en-US"/>
           </a:p>
@@ -5905,7 +5905,7 @@
           <a:p>
             <a:fld id="{00F5AAE2-11C8-4D46-A716-B78E4D7C1BCB}" type="datetimeFigureOut">
               <a:rPr lang="en-US" smtClean="0"/>
-              <a:t>12/6/2023</a:t>
+              <a:t>12/7/2023</a:t>
             </a:fld>
             <a:endParaRPr lang="en-US"/>
           </a:p>
@@ -6018,7 +6018,7 @@
           <a:p>
             <a:fld id="{00F5AAE2-11C8-4D46-A716-B78E4D7C1BCB}" type="datetimeFigureOut">
               <a:rPr lang="en-US" smtClean="0"/>
-              <a:t>12/6/2023</a:t>
+              <a:t>12/7/2023</a:t>
             </a:fld>
             <a:endParaRPr lang="en-US"/>
           </a:p>
@@ -6329,7 +6329,7 @@
           <a:p>
             <a:fld id="{00F5AAE2-11C8-4D46-A716-B78E4D7C1BCB}" type="datetimeFigureOut">
               <a:rPr lang="en-US" smtClean="0"/>
-              <a:t>12/6/2023</a:t>
+              <a:t>12/7/2023</a:t>
             </a:fld>
             <a:endParaRPr lang="en-US"/>
           </a:p>
@@ -6617,7 +6617,7 @@
           <a:p>
             <a:fld id="{00F5AAE2-11C8-4D46-A716-B78E4D7C1BCB}" type="datetimeFigureOut">
               <a:rPr lang="en-US" smtClean="0"/>
-              <a:t>12/6/2023</a:t>
+              <a:t>12/7/2023</a:t>
             </a:fld>
             <a:endParaRPr lang="en-US"/>
           </a:p>
@@ -6858,7 +6858,7 @@
           <a:p>
             <a:fld id="{00F5AAE2-11C8-4D46-A716-B78E4D7C1BCB}" type="datetimeFigureOut">
               <a:rPr lang="en-US" smtClean="0"/>
-              <a:t>12/6/2023</a:t>
+              <a:t>12/7/2023</a:t>
             </a:fld>
             <a:endParaRPr lang="en-US"/>
           </a:p>
@@ -36066,7 +36066,7 @@
           <a:p>
             <a:r>
               <a:rPr lang="en-US" dirty="0"/>
-              <a:t>R ignores whitespace</a:t>
+              <a:t>R ignores whitespace between things</a:t>
             </a:r>
           </a:p>
           <a:p>
@@ -39758,7 +39758,7 @@
         <p:spPr>
           <a:xfrm>
             <a:off x="5184329" y="1342378"/>
-            <a:ext cx="4072353" cy="1018001"/>
+            <a:ext cx="4072353" cy="1315566"/>
           </a:xfrm>
           <a:prstGeom prst="rect">
             <a:avLst/>
@@ -39938,7 +39938,7 @@
             </a:pPr>
             <a:r>
               <a:rPr lang="en-US" i="1" dirty="0"/>
-              <a:t>R ignores whitespace, which includes &lt;return&gt;</a:t>
+              <a:t>R ignores whitespace between things, which includes &lt;return&gt;</a:t>
             </a:r>
           </a:p>
           <a:p>

</xml_diff>

<commit_message>
minor changes to ppts 3 and 4 before I do some other things
</commit_message>
<xml_diff>
--- a/presentations/3 - Programming Basics 1 - Poke the Box.pptx
+++ b/presentations/3 - Programming Basics 1 - Poke the Box.pptx
@@ -240,7 +240,7 @@
           <a:p>
             <a:fld id="{0C3747FC-B9FC-4317-A7AC-005EC1BA3397}" type="datetimeFigureOut">
               <a:rPr lang="en-US" smtClean="0"/>
-              <a:t>12/7/2023</a:t>
+              <a:t>12/10/2023</a:t>
             </a:fld>
             <a:endParaRPr lang="en-US"/>
           </a:p>
@@ -2869,7 +2869,7 @@
           <a:p>
             <a:r>
               <a:rPr lang="en-US" dirty="0"/>
-              <a:t>So we created a vector of field techs two ways: look at the difference in how R behaves</a:t>
+              <a:t>So we created a vector two ways: look at the difference in how R behaves</a:t>
             </a:r>
           </a:p>
           <a:p>
@@ -2884,15 +2884,7 @@
           <a:p>
             <a:r>
               <a:rPr lang="en-US" dirty="0"/>
-              <a:t>And this is a little odd: R will actually let you </a:t>
-            </a:r>
-            <a:r>
-              <a:rPr lang="en-US"/>
-              <a:t>convert factor </a:t>
-            </a:r>
-            <a:r>
-              <a:rPr lang="en-US" dirty="0"/>
-              <a:t>to numeric</a:t>
+              <a:t>And this is a little odd: R will actually let you convert factor to numeric</a:t>
             </a:r>
           </a:p>
         </p:txBody>
@@ -4208,7 +4200,7 @@
           <a:p>
             <a:fld id="{00F5AAE2-11C8-4D46-A716-B78E4D7C1BCB}" type="datetimeFigureOut">
               <a:rPr lang="en-US" smtClean="0"/>
-              <a:t>12/7/2023</a:t>
+              <a:t>12/10/2023</a:t>
             </a:fld>
             <a:endParaRPr lang="en-US"/>
           </a:p>
@@ -4406,7 +4398,7 @@
           <a:p>
             <a:fld id="{00F5AAE2-11C8-4D46-A716-B78E4D7C1BCB}" type="datetimeFigureOut">
               <a:rPr lang="en-US" smtClean="0"/>
-              <a:t>12/7/2023</a:t>
+              <a:t>12/10/2023</a:t>
             </a:fld>
             <a:endParaRPr lang="en-US"/>
           </a:p>
@@ -4614,7 +4606,7 @@
           <a:p>
             <a:fld id="{00F5AAE2-11C8-4D46-A716-B78E4D7C1BCB}" type="datetimeFigureOut">
               <a:rPr lang="en-US" smtClean="0"/>
-              <a:t>12/7/2023</a:t>
+              <a:t>12/10/2023</a:t>
             </a:fld>
             <a:endParaRPr lang="en-US"/>
           </a:p>
@@ -4812,7 +4804,7 @@
           <a:p>
             <a:fld id="{00F5AAE2-11C8-4D46-A716-B78E4D7C1BCB}" type="datetimeFigureOut">
               <a:rPr lang="en-US" smtClean="0"/>
-              <a:t>12/7/2023</a:t>
+              <a:t>12/10/2023</a:t>
             </a:fld>
             <a:endParaRPr lang="en-US"/>
           </a:p>
@@ -5087,7 +5079,7 @@
           <a:p>
             <a:fld id="{00F5AAE2-11C8-4D46-A716-B78E4D7C1BCB}" type="datetimeFigureOut">
               <a:rPr lang="en-US" smtClean="0"/>
-              <a:t>12/7/2023</a:t>
+              <a:t>12/10/2023</a:t>
             </a:fld>
             <a:endParaRPr lang="en-US"/>
           </a:p>
@@ -5352,7 +5344,7 @@
           <a:p>
             <a:fld id="{00F5AAE2-11C8-4D46-A716-B78E4D7C1BCB}" type="datetimeFigureOut">
               <a:rPr lang="en-US" smtClean="0"/>
-              <a:t>12/7/2023</a:t>
+              <a:t>12/10/2023</a:t>
             </a:fld>
             <a:endParaRPr lang="en-US"/>
           </a:p>
@@ -5764,7 +5756,7 @@
           <a:p>
             <a:fld id="{00F5AAE2-11C8-4D46-A716-B78E4D7C1BCB}" type="datetimeFigureOut">
               <a:rPr lang="en-US" smtClean="0"/>
-              <a:t>12/7/2023</a:t>
+              <a:t>12/10/2023</a:t>
             </a:fld>
             <a:endParaRPr lang="en-US"/>
           </a:p>
@@ -5905,7 +5897,7 @@
           <a:p>
             <a:fld id="{00F5AAE2-11C8-4D46-A716-B78E4D7C1BCB}" type="datetimeFigureOut">
               <a:rPr lang="en-US" smtClean="0"/>
-              <a:t>12/7/2023</a:t>
+              <a:t>12/10/2023</a:t>
             </a:fld>
             <a:endParaRPr lang="en-US"/>
           </a:p>
@@ -6018,7 +6010,7 @@
           <a:p>
             <a:fld id="{00F5AAE2-11C8-4D46-A716-B78E4D7C1BCB}" type="datetimeFigureOut">
               <a:rPr lang="en-US" smtClean="0"/>
-              <a:t>12/7/2023</a:t>
+              <a:t>12/10/2023</a:t>
             </a:fld>
             <a:endParaRPr lang="en-US"/>
           </a:p>
@@ -6329,7 +6321,7 @@
           <a:p>
             <a:fld id="{00F5AAE2-11C8-4D46-A716-B78E4D7C1BCB}" type="datetimeFigureOut">
               <a:rPr lang="en-US" smtClean="0"/>
-              <a:t>12/7/2023</a:t>
+              <a:t>12/10/2023</a:t>
             </a:fld>
             <a:endParaRPr lang="en-US"/>
           </a:p>
@@ -6617,7 +6609,7 @@
           <a:p>
             <a:fld id="{00F5AAE2-11C8-4D46-A716-B78E4D7C1BCB}" type="datetimeFigureOut">
               <a:rPr lang="en-US" smtClean="0"/>
-              <a:t>12/7/2023</a:t>
+              <a:t>12/10/2023</a:t>
             </a:fld>
             <a:endParaRPr lang="en-US"/>
           </a:p>
@@ -6858,7 +6850,7 @@
           <a:p>
             <a:fld id="{00F5AAE2-11C8-4D46-A716-B78E4D7C1BCB}" type="datetimeFigureOut">
               <a:rPr lang="en-US" smtClean="0"/>
-              <a:t>12/7/2023</a:t>
+              <a:t>12/10/2023</a:t>
             </a:fld>
             <a:endParaRPr lang="en-US"/>
           </a:p>
@@ -19468,7 +19460,11 @@
           <a:p>
             <a:r>
               <a:rPr lang="en-US" sz="3600" dirty="0"/>
-              <a:t>Classes of vectors: R can store different kinds of information</a:t>
+              <a:t>Classes of vectors: </a:t>
+            </a:r>
+            <a:r>
+              <a:rPr lang="en-US" sz="3600" b="1" dirty="0"/>
+              <a:t>R can store different kinds of information</a:t>
             </a:r>
           </a:p>
         </p:txBody>
@@ -28590,7 +28586,7 @@
                   <a:schemeClr val="accent1"/>
                 </a:solidFill>
               </a:rPr>
-              <a:t>tech_char</a:t>
+              <a:t>rating_char</a:t>
             </a:r>
             <a:r>
               <a:rPr lang="en-US" dirty="0">
@@ -28606,7 +28602,7 @@
                   <a:schemeClr val="accent1"/>
                 </a:solidFill>
               </a:rPr>
-              <a:t>Chuck","Albert","Betty","Albert","Betty</a:t>
+              <a:t>Low","Medium","High","Low","Medium</a:t>
             </a:r>
             <a:r>
               <a:rPr lang="en-US" dirty="0">
@@ -28627,7 +28623,7 @@
                   <a:schemeClr val="accent1"/>
                 </a:solidFill>
               </a:rPr>
-              <a:t>tech_factor</a:t>
+              <a:t>rating_factor</a:t>
             </a:r>
             <a:r>
               <a:rPr lang="en-US" dirty="0">
@@ -28659,7 +28655,7 @@
                   <a:schemeClr val="accent1"/>
                 </a:solidFill>
               </a:rPr>
-              <a:t>tech_char</a:t>
+              <a:t>rating_char</a:t>
             </a:r>
             <a:r>
               <a:rPr lang="en-US" dirty="0">
@@ -28690,7 +28686,7 @@
                   <a:schemeClr val="accent1"/>
                 </a:solidFill>
               </a:rPr>
-              <a:t>tech_char</a:t>
+              <a:t>rating_char</a:t>
             </a:r>
             <a:endParaRPr lang="en-US" dirty="0">
               <a:solidFill>
@@ -28704,7 +28700,7 @@
             </a:pPr>
             <a:r>
               <a:rPr lang="en-US" dirty="0"/>
-              <a:t>[1] Chuck  Albert Betty  Albert Betty </a:t>
+              <a:t>[1] "Low"    "Medium" "High"   "Low"    "Medium"</a:t>
             </a:r>
           </a:p>
           <a:p>
@@ -28717,7 +28713,7 @@
                   <a:schemeClr val="accent1"/>
                 </a:solidFill>
               </a:rPr>
-              <a:t>tech_factor</a:t>
+              <a:t>rating_factor</a:t>
             </a:r>
             <a:endParaRPr lang="en-US" dirty="0">
               <a:solidFill>
@@ -28731,7 +28727,7 @@
             </a:pPr>
             <a:r>
               <a:rPr lang="en-US" dirty="0"/>
-              <a:t>[1] Chuck  Albert Betty  Albert Betty </a:t>
+              <a:t>[1] Low    Medium High   Low    Medium</a:t>
             </a:r>
           </a:p>
           <a:p>
@@ -28740,7 +28736,7 @@
             </a:pPr>
             <a:r>
               <a:rPr lang="en-US" dirty="0"/>
-              <a:t>Levels: Albert Betty Chuck</a:t>
+              <a:t>Levels: High Low Medium</a:t>
             </a:r>
             <a:endParaRPr lang="en-US" dirty="0">
               <a:solidFill>
@@ -28784,7 +28780,7 @@
                   <a:schemeClr val="accent1"/>
                 </a:solidFill>
               </a:rPr>
-              <a:t>tech_factor</a:t>
+              <a:t>rating_factor</a:t>
             </a:r>
             <a:r>
               <a:rPr lang="en-US" dirty="0">
@@ -28801,14 +28797,8 @@
             </a:pPr>
             <a:r>
               <a:rPr lang="en-US" dirty="0"/>
-              <a:t>[1] 3 1 2 1 2</a:t>
-            </a:r>
-          </a:p>
-          <a:p>
-            <a:pPr marL="0" indent="0">
-              <a:buNone/>
-            </a:pPr>
-            <a:endParaRPr lang="en-US" dirty="0"/>
+              <a:t>[1] 2 3 1 2 3</a:t>
+            </a:r>
           </a:p>
           <a:p>
             <a:pPr marL="0" indent="0">
@@ -29037,8 +29027,8 @@
         </p:nvSpPr>
         <p:spPr>
           <a:xfrm>
-            <a:off x="7226705" y="3531768"/>
-            <a:ext cx="4683269" cy="2780542"/>
+            <a:off x="8094796" y="3254635"/>
+            <a:ext cx="3851398" cy="3303639"/>
           </a:xfrm>
           <a:prstGeom prst="rect">
             <a:avLst/>
@@ -38960,7 +38950,7 @@
             </a:r>
             <a:r>
               <a:rPr lang="en-US" dirty="0"/>
-              <a:t> is a way of denoting a known unknown</a:t>
+              <a:t> is a placeholder for an unknown quantity</a:t>
             </a:r>
           </a:p>
           <a:p>
@@ -39002,7 +38992,7 @@
             <a:pPr lvl="1"/>
             <a:r>
               <a:rPr lang="en-US" dirty="0"/>
-              <a:t>“Warning” means it did</a:t>
+              <a:t>“Warning” means it did evaluate</a:t>
             </a:r>
           </a:p>
           <a:p>
@@ -39963,7 +39953,7 @@
         <p:spPr>
           <a:xfrm flipH="1" flipV="1">
             <a:off x="1588168" y="2666198"/>
-            <a:ext cx="259883" cy="548640"/>
+            <a:ext cx="359165" cy="496720"/>
           </a:xfrm>
           <a:prstGeom prst="straightConnector1">
             <a:avLst/>
@@ -40003,7 +39993,7 @@
         </p:nvSpPr>
         <p:spPr>
           <a:xfrm>
-            <a:off x="1097020" y="3328480"/>
+            <a:off x="1097020" y="3240907"/>
             <a:ext cx="5661054" cy="908351"/>
           </a:xfrm>
           <a:prstGeom prst="rect">
@@ -40208,8 +40198,8 @@
         </p:nvSpPr>
         <p:spPr>
           <a:xfrm>
-            <a:off x="1131632" y="4907367"/>
-            <a:ext cx="2332919" cy="1719063"/>
+            <a:off x="457200" y="4485453"/>
+            <a:ext cx="3470347" cy="2140978"/>
           </a:xfrm>
           <a:prstGeom prst="rect">
             <a:avLst/>
@@ -40222,7 +40212,7 @@
         </p:spPr>
         <p:txBody>
           <a:bodyPr vert="horz" lIns="91440" tIns="45720" rIns="91440" bIns="45720" rtlCol="0">
-            <a:normAutofit/>
+            <a:normAutofit fontScale="92500"/>
           </a:bodyPr>
           <a:lstStyle>
             <a:lvl1pPr marL="228600" indent="-228600" algn="l" defTabSz="914400" rtl="0" eaLnBrk="1" latinLnBrk="0" hangingPunct="1">
@@ -40398,21 +40388,33 @@
             </a:r>
           </a:p>
           <a:p>
-            <a:pPr marL="0" indent="0">
-              <a:buNone/>
+            <a:pPr marL="514350" indent="-514350">
+              <a:buFont typeface="+mj-lt"/>
+              <a:buAutoNum type="arabicPeriod"/>
             </a:pPr>
             <a:r>
               <a:rPr lang="en-US" b="1" dirty="0"/>
-              <a:t>&lt;esc&gt; key</a:t>
-            </a:r>
-          </a:p>
-          <a:p>
-            <a:pPr marL="0" indent="0">
-              <a:buNone/>
+              <a:t>Click in the console</a:t>
+            </a:r>
+          </a:p>
+          <a:p>
+            <a:pPr marL="514350" indent="-514350">
+              <a:buFont typeface="+mj-lt"/>
+              <a:buAutoNum type="arabicPeriod"/>
             </a:pPr>
             <a:r>
               <a:rPr lang="en-US" b="1" dirty="0"/>
-              <a:t>and try again</a:t>
+              <a:t>Hit the &lt;esc&gt; key</a:t>
+            </a:r>
+          </a:p>
+          <a:p>
+            <a:pPr marL="514350" indent="-514350">
+              <a:buFont typeface="+mj-lt"/>
+              <a:buAutoNum type="arabicPeriod"/>
+            </a:pPr>
+            <a:r>
+              <a:rPr lang="en-US" b="1" dirty="0"/>
+              <a:t>Try again</a:t>
             </a:r>
           </a:p>
           <a:p>
@@ -40442,7 +40444,7 @@
         </p:blipFill>
         <p:spPr>
           <a:xfrm>
-            <a:off x="4350308" y="5072929"/>
+            <a:off x="4972469" y="5012116"/>
             <a:ext cx="2332918" cy="1387938"/>
           </a:xfrm>
           <a:prstGeom prst="rect">
@@ -41686,7 +41688,7 @@
         <p:spPr>
           <a:xfrm>
             <a:off x="398536" y="4833211"/>
-            <a:ext cx="3927256" cy="1719063"/>
+            <a:ext cx="5420372" cy="1719063"/>
           </a:xfrm>
           <a:prstGeom prst="rect">
             <a:avLst/>
@@ -41883,7 +41885,7 @@
           <a:p>
             <a:r>
               <a:rPr lang="en-US" b="1" dirty="0"/>
-              <a:t>&lt;esc&gt; might work too</a:t>
+              <a:t>Console + &lt;esc&gt; might work too</a:t>
             </a:r>
           </a:p>
         </p:txBody>

</xml_diff>